<commit_message>
fixed the check in
</commit_message>
<xml_diff>
--- a/LightingTalks/10 Good Habits for Developers.pptx
+++ b/LightingTalks/10 Good Habits for Developers.pptx
@@ -5,10 +5,10 @@
     <p:sldMasterId id="2147483648" r:id="rId1"/>
   </p:sldMasterIdLst>
   <p:notesMasterIdLst>
-    <p:notesMasterId r:id="rId17"/>
+    <p:notesMasterId r:id="rId16"/>
   </p:notesMasterIdLst>
   <p:handoutMasterIdLst>
-    <p:handoutMasterId r:id="rId18"/>
+    <p:handoutMasterId r:id="rId17"/>
   </p:handoutMasterIdLst>
   <p:sldIdLst>
     <p:sldId id="375" r:id="rId2"/>
@@ -25,7 +25,6 @@
     <p:sldId id="416" r:id="rId13"/>
     <p:sldId id="417" r:id="rId14"/>
     <p:sldId id="303" r:id="rId15"/>
-    <p:sldId id="304" r:id="rId16"/>
   </p:sldIdLst>
   <p:sldSz cx="12192000" cy="6858000"/>
   <p:notesSz cx="6858000" cy="9144000"/>
@@ -229,7 +228,7 @@
           <a:p>
             <a:fld id="{DE773F5E-F60B-3D42-A6DD-6D5611C2F6EE}" type="datetimeFigureOut">
               <a:rPr lang="en-US" smtClean="0"/>
-              <a:t>6/25/2020</a:t>
+              <a:t>6/26/2020</a:t>
             </a:fld>
             <a:endParaRPr lang="en-US" dirty="0"/>
           </a:p>
@@ -406,7 +405,7 @@
           <a:p>
             <a:fld id="{888C92C4-255A-4ECC-BDAE-F3A45B10634F}" type="datetimeFigureOut">
               <a:rPr lang="en-US" smtClean="0"/>
-              <a:t>6/25/2020</a:t>
+              <a:t>6/26/2020</a:t>
             </a:fld>
             <a:endParaRPr lang="en-US" dirty="0"/>
           </a:p>
@@ -717,7 +716,31 @@
           <a:bodyPr/>
           <a:lstStyle/>
           <a:p>
-            <a:endParaRPr lang="en-US" dirty="0"/>
+            <a:pPr marL="228600" indent="-228600">
+              <a:buAutoNum type="arabicPeriod"/>
+            </a:pPr>
+            <a:r>
+              <a:rPr lang="en-US" dirty="0"/>
+              <a:t>Welcome</a:t>
+            </a:r>
+          </a:p>
+          <a:p>
+            <a:pPr marL="228600" indent="-228600">
+              <a:buAutoNum type="arabicPeriod"/>
+            </a:pPr>
+            <a:r>
+              <a:rPr lang="en-US" dirty="0"/>
+              <a:t>These are my opinions</a:t>
+            </a:r>
+          </a:p>
+          <a:p>
+            <a:pPr marL="228600" indent="-228600">
+              <a:buAutoNum type="arabicPeriod"/>
+            </a:pPr>
+            <a:r>
+              <a:rPr lang="en-US" dirty="0"/>
+              <a:t>Do not reflex the option of my employer, wife, kids or dogs</a:t>
+            </a:r>
           </a:p>
         </p:txBody>
       </p:sp>
@@ -801,6 +824,9 @@
           <a:bodyPr/>
           <a:lstStyle/>
           <a:p>
+            <a:pPr marL="228600" indent="-228600">
+              <a:buAutoNum type="arabicPeriod"/>
+            </a:pPr>
             <a:r>
               <a:rPr lang="en-US" sz="1200" kern="1200" dirty="0">
                 <a:solidFill>
@@ -811,10 +837,13 @@
                 <a:ea typeface="+mn-ea"/>
                 <a:cs typeface="+mn-cs"/>
               </a:rPr>
-              <a:t>Frustration is very common with development.  You cannot give up on the first issue.  You must keep going.  You will learn by these frustrations.   You will always hear the saying “Success is just around the corner”.</a:t>
-            </a:r>
-          </a:p>
-          <a:p>
+              <a:t>Frustration is very common with development.  </a:t>
+            </a:r>
+          </a:p>
+          <a:p>
+            <a:pPr marL="228600" indent="-228600">
+              <a:buAutoNum type="arabicPeriod"/>
+            </a:pPr>
             <a:r>
               <a:rPr lang="en-US" sz="1200" kern="1200" dirty="0">
                 <a:solidFill>
@@ -825,7 +854,114 @@
                 <a:ea typeface="+mn-ea"/>
                 <a:cs typeface="+mn-cs"/>
               </a:rPr>
-              <a:t>There is a balance between not giving up and asking for help to soon or too often.  You will learn the tipping points for these.  It will come with experience.</a:t>
+              <a:t>You cannot give up on the first issue.  </a:t>
+            </a:r>
+          </a:p>
+          <a:p>
+            <a:pPr marL="228600" indent="-228600">
+              <a:buAutoNum type="arabicPeriod"/>
+            </a:pPr>
+            <a:r>
+              <a:rPr lang="en-US" sz="1200" kern="1200" dirty="0">
+                <a:solidFill>
+                  <a:schemeClr val="tx1"/>
+                </a:solidFill>
+                <a:effectLst/>
+                <a:latin typeface="+mn-lt"/>
+                <a:ea typeface="+mn-ea"/>
+                <a:cs typeface="+mn-cs"/>
+              </a:rPr>
+              <a:t>You must keep going.  </a:t>
+            </a:r>
+          </a:p>
+          <a:p>
+            <a:pPr marL="228600" indent="-228600">
+              <a:buAutoNum type="arabicPeriod"/>
+            </a:pPr>
+            <a:r>
+              <a:rPr lang="en-US" sz="1200" kern="1200" dirty="0">
+                <a:solidFill>
+                  <a:schemeClr val="tx1"/>
+                </a:solidFill>
+                <a:effectLst/>
+                <a:latin typeface="+mn-lt"/>
+                <a:ea typeface="+mn-ea"/>
+                <a:cs typeface="+mn-cs"/>
+              </a:rPr>
+              <a:t>You will learn by these frustrations.   </a:t>
+            </a:r>
+          </a:p>
+          <a:p>
+            <a:pPr marL="228600" indent="-228600">
+              <a:buAutoNum type="arabicPeriod"/>
+            </a:pPr>
+            <a:r>
+              <a:rPr lang="en-US" sz="1200" kern="1200" dirty="0">
+                <a:solidFill>
+                  <a:schemeClr val="tx1"/>
+                </a:solidFill>
+                <a:effectLst/>
+                <a:latin typeface="+mn-lt"/>
+                <a:ea typeface="+mn-ea"/>
+                <a:cs typeface="+mn-cs"/>
+              </a:rPr>
+              <a:t>We all have heard the saying “Success is just around the corner”.</a:t>
+            </a:r>
+          </a:p>
+          <a:p>
+            <a:pPr marL="228600" indent="-228600">
+              <a:buAutoNum type="arabicPeriod"/>
+            </a:pPr>
+            <a:endParaRPr lang="en-US" sz="1200" kern="1200" dirty="0">
+              <a:solidFill>
+                <a:schemeClr val="tx1"/>
+              </a:solidFill>
+              <a:effectLst/>
+              <a:latin typeface="+mn-lt"/>
+              <a:ea typeface="+mn-ea"/>
+              <a:cs typeface="+mn-cs"/>
+            </a:endParaRPr>
+          </a:p>
+          <a:p>
+            <a:r>
+              <a:rPr lang="en-US" sz="1200" kern="1200" dirty="0">
+                <a:solidFill>
+                  <a:schemeClr val="tx1"/>
+                </a:solidFill>
+                <a:effectLst/>
+                <a:latin typeface="+mn-lt"/>
+                <a:ea typeface="+mn-ea"/>
+                <a:cs typeface="+mn-cs"/>
+              </a:rPr>
+              <a:t>There is a balance between not giving up and asking for help to soon or too often.  </a:t>
+            </a:r>
+          </a:p>
+          <a:p>
+            <a:r>
+              <a:rPr lang="en-US" sz="1200" kern="1200" dirty="0">
+                <a:solidFill>
+                  <a:schemeClr val="tx1"/>
+                </a:solidFill>
+                <a:effectLst/>
+                <a:latin typeface="+mn-lt"/>
+                <a:ea typeface="+mn-ea"/>
+                <a:cs typeface="+mn-cs"/>
+              </a:rPr>
+              <a:t>You will learn the tipping points for these.  </a:t>
+            </a:r>
+          </a:p>
+          <a:p>
+            <a:r>
+              <a:rPr lang="en-US" sz="1200" kern="1200" dirty="0">
+                <a:solidFill>
+                  <a:schemeClr val="tx1"/>
+                </a:solidFill>
+                <a:effectLst/>
+                <a:latin typeface="+mn-lt"/>
+                <a:ea typeface="+mn-ea"/>
+                <a:cs typeface="+mn-cs"/>
+              </a:rPr>
+              <a:t>It will come with experience.</a:t>
             </a:r>
           </a:p>
           <a:p>
@@ -913,6 +1049,9 @@
           <a:bodyPr/>
           <a:lstStyle/>
           <a:p>
+            <a:pPr marL="228600" indent="-228600">
+              <a:buAutoNum type="arabicPeriod"/>
+            </a:pPr>
             <a:r>
               <a:rPr lang="en-US" sz="1200" kern="1200" dirty="0">
                 <a:solidFill>
@@ -923,7 +1062,92 @@
                 <a:ea typeface="+mn-ea"/>
                 <a:cs typeface="+mn-cs"/>
               </a:rPr>
-              <a:t>We all have seen and know the “that person”, hard to work with, a know it all, more willing to tell you it wont work as opposed to helping you getting it to work.  Simply do not be that person.  </a:t>
+              <a:t>We all have seen and know the “that person”, </a:t>
+            </a:r>
+          </a:p>
+          <a:p>
+            <a:pPr marL="685800" lvl="1" indent="-228600">
+              <a:buAutoNum type="arabicPeriod"/>
+            </a:pPr>
+            <a:r>
+              <a:rPr lang="en-US" sz="1200" kern="1200" dirty="0">
+                <a:solidFill>
+                  <a:schemeClr val="tx1"/>
+                </a:solidFill>
+                <a:effectLst/>
+                <a:latin typeface="+mn-lt"/>
+                <a:ea typeface="+mn-ea"/>
+                <a:cs typeface="+mn-cs"/>
+              </a:rPr>
+              <a:t>hard to work with, </a:t>
+            </a:r>
+          </a:p>
+          <a:p>
+            <a:pPr marL="685800" lvl="1" indent="-228600">
+              <a:buAutoNum type="arabicPeriod"/>
+            </a:pPr>
+            <a:r>
+              <a:rPr lang="en-US" sz="1200" kern="1200" dirty="0">
+                <a:solidFill>
+                  <a:schemeClr val="tx1"/>
+                </a:solidFill>
+                <a:effectLst/>
+                <a:latin typeface="+mn-lt"/>
+                <a:ea typeface="+mn-ea"/>
+                <a:cs typeface="+mn-cs"/>
+              </a:rPr>
+              <a:t>a know it all, </a:t>
+            </a:r>
+          </a:p>
+          <a:p>
+            <a:pPr marL="685800" lvl="1" indent="-228600">
+              <a:buAutoNum type="arabicPeriod"/>
+            </a:pPr>
+            <a:r>
+              <a:rPr lang="en-US" sz="1200" kern="1200" dirty="0">
+                <a:solidFill>
+                  <a:schemeClr val="tx1"/>
+                </a:solidFill>
+                <a:effectLst/>
+                <a:latin typeface="+mn-lt"/>
+                <a:ea typeface="+mn-ea"/>
+                <a:cs typeface="+mn-cs"/>
+              </a:rPr>
+              <a:t>more willing to tell you it wont work as opposed to helping you getting it to work.  </a:t>
+            </a:r>
+          </a:p>
+          <a:p>
+            <a:pPr marL="228600" lvl="0" indent="-228600">
+              <a:buAutoNum type="arabicPeriod"/>
+            </a:pPr>
+            <a:r>
+              <a:rPr lang="en-US" sz="1200" kern="1200" dirty="0">
+                <a:solidFill>
+                  <a:schemeClr val="tx1"/>
+                </a:solidFill>
+                <a:effectLst/>
+                <a:latin typeface="+mn-lt"/>
+                <a:ea typeface="+mn-ea"/>
+                <a:cs typeface="+mn-cs"/>
+              </a:rPr>
+              <a:t>Simply do not be that person.  </a:t>
+            </a:r>
+          </a:p>
+          <a:p>
+            <a:pPr marL="228600" lvl="0" indent="-228600">
+              <a:buAutoNum type="arabicPeriod"/>
+            </a:pPr>
+            <a:r>
+              <a:rPr lang="en-US" sz="1200" kern="1200" dirty="0">
+                <a:solidFill>
+                  <a:schemeClr val="tx1"/>
+                </a:solidFill>
+                <a:effectLst/>
+                <a:latin typeface="+mn-lt"/>
+                <a:ea typeface="+mn-ea"/>
+                <a:cs typeface="+mn-cs"/>
+              </a:rPr>
+              <a:t>If you cant think of any that is “that person” it might be you!</a:t>
             </a:r>
           </a:p>
           <a:p>
@@ -1109,7 +1333,7 @@
                 <a:ea typeface="+mn-ea"/>
                 <a:cs typeface="+mn-cs"/>
               </a:rPr>
-              <a:t>You need to understand that criticism makes you better when you can accept it and learn from it.  Try to say “Yes, Thank you”.</a:t>
+              <a:t>1. You need to understand that criticism makes you better when you can accept it and learn from it.  </a:t>
             </a:r>
           </a:p>
           <a:p>
@@ -1123,7 +1347,7 @@
                 <a:ea typeface="+mn-ea"/>
                 <a:cs typeface="+mn-cs"/>
               </a:rPr>
-              <a:t> </a:t>
+              <a:t>2. Try to say “Yes, Thank you”.</a:t>
             </a:r>
           </a:p>
           <a:p>
@@ -1137,7 +1361,21 @@
                 <a:ea typeface="+mn-ea"/>
                 <a:cs typeface="+mn-cs"/>
               </a:rPr>
-              <a:t>It is very easy and a natural reaction to get defensive when someone criticizes you.  Take a mental time out, relax, breath then answer.  </a:t>
+              <a:t>3. It is very easy and a natural reaction to get defensive when someone criticizes you.  </a:t>
+            </a:r>
+          </a:p>
+          <a:p>
+            <a:r>
+              <a:rPr lang="en-US" sz="1200" kern="1200" dirty="0">
+                <a:solidFill>
+                  <a:schemeClr val="tx1"/>
+                </a:solidFill>
+                <a:effectLst/>
+                <a:latin typeface="+mn-lt"/>
+                <a:ea typeface="+mn-ea"/>
+                <a:cs typeface="+mn-cs"/>
+              </a:rPr>
+              <a:t>4. Take a mental time out, relax, breath then answer.  </a:t>
             </a:r>
           </a:p>
           <a:p>
@@ -1235,7 +1473,69 @@
                 <a:ea typeface="+mn-ea"/>
                 <a:cs typeface="+mn-cs"/>
               </a:rPr>
-              <a:t>Not to get to philosophical, but you can only control your own thoughts and feelings.  Each morning you get to decide what your attitude will be for the day.  You can choose to be positive and happy, grumpy, and negative or worst yet, you do not think about it and let others influence your thoughts and feelings.  </a:t>
+              <a:t>Not to get to philosophical, but you can only control your own thoughts and feelings.  </a:t>
+            </a:r>
+          </a:p>
+          <a:p>
+            <a:endParaRPr lang="en-US" sz="1200" kern="1200" dirty="0">
+              <a:solidFill>
+                <a:schemeClr val="tx1"/>
+              </a:solidFill>
+              <a:effectLst/>
+              <a:latin typeface="+mn-lt"/>
+              <a:ea typeface="+mn-ea"/>
+              <a:cs typeface="+mn-cs"/>
+            </a:endParaRPr>
+          </a:p>
+          <a:p>
+            <a:pPr marL="228600" indent="-228600">
+              <a:buAutoNum type="arabicPeriod"/>
+            </a:pPr>
+            <a:r>
+              <a:rPr lang="en-US" sz="1200" kern="1200" dirty="0">
+                <a:solidFill>
+                  <a:schemeClr val="tx1"/>
+                </a:solidFill>
+                <a:effectLst/>
+                <a:latin typeface="+mn-lt"/>
+                <a:ea typeface="+mn-ea"/>
+                <a:cs typeface="+mn-cs"/>
+              </a:rPr>
+              <a:t>Each morning you get to decide what your attitude will be for the day.  </a:t>
+            </a:r>
+          </a:p>
+          <a:p>
+            <a:pPr marL="228600" indent="-228600">
+              <a:buAutoNum type="arabicPeriod"/>
+            </a:pPr>
+            <a:r>
+              <a:rPr lang="en-US" sz="1200" kern="1200" dirty="0">
+                <a:solidFill>
+                  <a:schemeClr val="tx1"/>
+                </a:solidFill>
+                <a:effectLst/>
+                <a:latin typeface="+mn-lt"/>
+                <a:ea typeface="+mn-ea"/>
+                <a:cs typeface="+mn-cs"/>
+              </a:rPr>
+              <a:t>You can choose to be positive and happy, grumpy, and negative or </a:t>
+            </a:r>
+          </a:p>
+          <a:p>
+            <a:pPr marL="228600" indent="-228600">
+              <a:buAutoNum type="arabicPeriod"/>
+            </a:pPr>
+            <a:r>
+              <a:rPr lang="en-US" sz="1200" kern="1200" dirty="0">
+                <a:solidFill>
+                  <a:schemeClr val="tx1"/>
+                </a:solidFill>
+                <a:effectLst/>
+                <a:latin typeface="+mn-lt"/>
+                <a:ea typeface="+mn-ea"/>
+                <a:cs typeface="+mn-cs"/>
+              </a:rPr>
+              <a:t>worst yet, you do not think about it and let others or even “That Person” influence your thoughts and feelings.  </a:t>
             </a:r>
           </a:p>
           <a:p>
@@ -1335,6 +1635,26 @@
             </a:r>
           </a:p>
           <a:p>
+            <a:endParaRPr lang="en-US" sz="1200" dirty="0"/>
+          </a:p>
+          <a:p>
+            <a:r>
+              <a:rPr lang="en-US" sz="1200" dirty="0"/>
+              <a:t>Again, only my opinion, I suggest you make your list and get started today!  </a:t>
+            </a:r>
+          </a:p>
+          <a:p>
+            <a:r>
+              <a:rPr lang="en-US" sz="1200" dirty="0"/>
+              <a:t>It is well worth </a:t>
+            </a:r>
+            <a:r>
+              <a:rPr lang="en-US" sz="1200"/>
+              <a:t>the reward.</a:t>
+            </a:r>
+            <a:endParaRPr lang="en-US" sz="1200" dirty="0"/>
+          </a:p>
+          <a:p>
             <a:endParaRPr lang="en-US" dirty="0"/>
           </a:p>
         </p:txBody>
@@ -1366,90 +1686,6 @@
     <p:extLst>
       <p:ext uri="{BB962C8B-B14F-4D97-AF65-F5344CB8AC3E}">
         <p14:creationId xmlns:p14="http://schemas.microsoft.com/office/powerpoint/2010/main" val="3574128796"/>
-      </p:ext>
-    </p:extLst>
-  </p:cSld>
-  <p:clrMapOvr>
-    <a:masterClrMapping/>
-  </p:clrMapOvr>
-</p:notes>
-</file>
-
-<file path=ppt/notesSlides/notesSlide15.xml><?xml version="1.0" encoding="utf-8"?>
-<p:notes xmlns:a="http://schemas.openxmlformats.org/drawingml/2006/main" xmlns:r="http://schemas.openxmlformats.org/officeDocument/2006/relationships" xmlns:p="http://schemas.openxmlformats.org/presentationml/2006/main">
-  <p:cSld>
-    <p:spTree>
-      <p:nvGrpSpPr>
-        <p:cNvPr id="1" name=""/>
-        <p:cNvGrpSpPr/>
-        <p:nvPr/>
-      </p:nvGrpSpPr>
-      <p:grpSpPr>
-        <a:xfrm>
-          <a:off x="0" y="0"/>
-          <a:ext cx="0" cy="0"/>
-          <a:chOff x="0" y="0"/>
-          <a:chExt cx="0" cy="0"/>
-        </a:xfrm>
-      </p:grpSpPr>
-      <p:sp>
-        <p:nvSpPr>
-          <p:cNvPr id="2" name="Slide Image Placeholder 1"/>
-          <p:cNvSpPr>
-            <a:spLocks noGrp="1" noRot="1" noChangeAspect="1"/>
-          </p:cNvSpPr>
-          <p:nvPr>
-            <p:ph type="sldImg"/>
-          </p:nvPr>
-        </p:nvSpPr>
-        <p:spPr/>
-      </p:sp>
-      <p:sp>
-        <p:nvSpPr>
-          <p:cNvPr id="3" name="Notes Placeholder 2"/>
-          <p:cNvSpPr>
-            <a:spLocks noGrp="1"/>
-          </p:cNvSpPr>
-          <p:nvPr>
-            <p:ph type="body" idx="1"/>
-          </p:nvPr>
-        </p:nvSpPr>
-        <p:spPr/>
-        <p:txBody>
-          <a:bodyPr/>
-          <a:lstStyle/>
-          <a:p>
-            <a:endParaRPr lang="en-US" dirty="0"/>
-          </a:p>
-        </p:txBody>
-      </p:sp>
-      <p:sp>
-        <p:nvSpPr>
-          <p:cNvPr id="4" name="Slide Number Placeholder 3"/>
-          <p:cNvSpPr>
-            <a:spLocks noGrp="1"/>
-          </p:cNvSpPr>
-          <p:nvPr>
-            <p:ph type="sldNum" sz="quarter" idx="5"/>
-          </p:nvPr>
-        </p:nvSpPr>
-        <p:spPr/>
-        <p:txBody>
-          <a:bodyPr/>
-          <a:lstStyle/>
-          <a:p>
-            <a:fld id="{03382EDC-727F-43EB-AF48-997B1C8D3761}" type="slidenum">
-              <a:rPr lang="en-US" smtClean="0"/>
-              <a:t>15</a:t>
-            </a:fld>
-            <a:endParaRPr lang="en-US" dirty="0"/>
-          </a:p>
-        </p:txBody>
-      </p:sp>
-    </p:spTree>
-    <p:extLst>
-      <p:ext uri="{BB962C8B-B14F-4D97-AF65-F5344CB8AC3E}">
-        <p14:creationId xmlns:p14="http://schemas.microsoft.com/office/powerpoint/2010/main" val="4017456995"/>
       </p:ext>
     </p:extLst>
   </p:cSld>
@@ -1515,7 +1751,31 @@
             <a:endParaRPr lang="en-US" dirty="0"/>
           </a:p>
           <a:p>
+            <a:r>
+              <a:rPr lang="en-US" dirty="0"/>
+              <a:t>https://www.amazon.com/s?k=power+of+habit&amp;ref=nb_sb_noss_2</a:t>
+            </a:r>
+          </a:p>
+          <a:p>
             <a:endParaRPr lang="en-US" dirty="0"/>
+          </a:p>
+          <a:p>
+            <a:pPr marL="228600" indent="-228600">
+              <a:buAutoNum type="arabicPeriod"/>
+            </a:pPr>
+            <a:r>
+              <a:rPr lang="en-US" dirty="0"/>
+              <a:t>What is a habit</a:t>
+            </a:r>
+          </a:p>
+          <a:p>
+            <a:pPr marL="228600" indent="-228600">
+              <a:buAutoNum type="arabicPeriod"/>
+            </a:pPr>
+            <a:r>
+              <a:rPr lang="en-US" dirty="0"/>
+              <a:t>Good resources</a:t>
+            </a:r>
           </a:p>
         </p:txBody>
       </p:sp>
@@ -1599,18 +1859,48 @@
           <a:bodyPr/>
           <a:lstStyle/>
           <a:p>
+            <a:pPr marL="228600" indent="-228600">
+              <a:buAutoNum type="arabicPeriod"/>
+            </a:pPr>
             <a:r>
               <a:rPr lang="en-US" sz="1200" dirty="0"/>
-              <a:t>You need to take frequent breaks, at least 5 minutes every hour or so.  Some developers use a pomodoro timer or type of system.  You need to get up from your chair and walk around.  Go outside, get fresh air.</a:t>
-            </a:r>
-          </a:p>
-          <a:p>
-            <a:endParaRPr lang="en-US" sz="1200" dirty="0"/>
-          </a:p>
-          <a:p>
+              <a:t>You need to take frequent breaks, at least 5 minutes every hour or so.  </a:t>
+            </a:r>
+          </a:p>
+          <a:p>
+            <a:pPr marL="228600" indent="-228600">
+              <a:buAutoNum type="arabicPeriod"/>
+            </a:pPr>
             <a:r>
               <a:rPr lang="en-US" sz="1200" dirty="0"/>
-              <a:t>When you are stuck on a problem, is the best time to take a break.  You will be surprised how quickly you resolve the issues after your break.</a:t>
+              <a:t>Some developers use a pomodoro timer or type of system.  </a:t>
+            </a:r>
+          </a:p>
+          <a:p>
+            <a:pPr marL="228600" indent="-228600">
+              <a:buAutoNum type="arabicPeriod"/>
+            </a:pPr>
+            <a:r>
+              <a:rPr lang="en-US" sz="1200" dirty="0"/>
+              <a:t>You need to get up from your chair and walk around.  Go outside, get fresh air.</a:t>
+            </a:r>
+          </a:p>
+          <a:p>
+            <a:pPr marL="228600" indent="-228600">
+              <a:buAutoNum type="arabicPeriod"/>
+            </a:pPr>
+            <a:r>
+              <a:rPr lang="en-US" sz="1200" dirty="0"/>
+              <a:t>When you are stuck on a problem, is the best time to take a break.  </a:t>
+            </a:r>
+          </a:p>
+          <a:p>
+            <a:pPr marL="228600" indent="-228600">
+              <a:buAutoNum type="arabicPeriod"/>
+            </a:pPr>
+            <a:r>
+              <a:rPr lang="en-US" sz="1200" dirty="0"/>
+              <a:t>You will be surprised how quickly you resolve the issues after your break.</a:t>
             </a:r>
           </a:p>
           <a:p>
@@ -1698,6 +1988,9 @@
           <a:bodyPr/>
           <a:lstStyle/>
           <a:p>
+            <a:pPr marL="228600" indent="-228600">
+              <a:buAutoNum type="arabicPeriod"/>
+            </a:pPr>
             <a:r>
               <a:rPr lang="en-US" sz="1200" kern="1200" dirty="0">
                 <a:solidFill>
@@ -1708,10 +2001,13 @@
                 <a:ea typeface="+mn-ea"/>
                 <a:cs typeface="+mn-cs"/>
               </a:rPr>
-              <a:t>This is a hard habit for many developers to do.  Developers by nature want to solve problems,  asking others seems to go against that.  Plus, there is the imposture syndrome as well.  Our career field is huge and constantly changing.  No can be expected to know of remember everything.   Change the way you think about asking for help.  Instead look at it as a learning opportunity. </a:t>
-            </a:r>
-          </a:p>
-          <a:p>
+              <a:t>This is a hard habit for many developers to do.  </a:t>
+            </a:r>
+          </a:p>
+          <a:p>
+            <a:pPr marL="228600" indent="-228600">
+              <a:buAutoNum type="arabicPeriod"/>
+            </a:pPr>
             <a:r>
               <a:rPr lang="en-US" sz="1200" kern="1200" dirty="0">
                 <a:solidFill>
@@ -1722,10 +2018,13 @@
                 <a:ea typeface="+mn-ea"/>
                 <a:cs typeface="+mn-cs"/>
               </a:rPr>
-              <a:t> </a:t>
-            </a:r>
-          </a:p>
-          <a:p>
+              <a:t>Developers by nature want to solve problems,  asking others seems to go against that.  </a:t>
+            </a:r>
+          </a:p>
+          <a:p>
+            <a:pPr marL="228600" indent="-228600">
+              <a:buAutoNum type="arabicPeriod"/>
+            </a:pPr>
             <a:r>
               <a:rPr lang="en-US" sz="1200" kern="1200" dirty="0">
                 <a:solidFill>
@@ -1736,7 +2035,75 @@
                 <a:ea typeface="+mn-ea"/>
                 <a:cs typeface="+mn-cs"/>
               </a:rPr>
-              <a:t>You need to remember that not asking for help is a waste of your time.  It is good to work a problem as much as you can, but we all have hit that virtual wall.  You need to be able to recognize </a:t>
+              <a:t>There is the imposture syndrome as well.  </a:t>
+            </a:r>
+          </a:p>
+          <a:p>
+            <a:pPr marL="228600" indent="-228600">
+              <a:buAutoNum type="arabicPeriod"/>
+            </a:pPr>
+            <a:r>
+              <a:rPr lang="en-US" sz="1200" kern="1200" dirty="0">
+                <a:solidFill>
+                  <a:schemeClr val="tx1"/>
+                </a:solidFill>
+                <a:effectLst/>
+                <a:latin typeface="+mn-lt"/>
+                <a:ea typeface="+mn-ea"/>
+                <a:cs typeface="+mn-cs"/>
+              </a:rPr>
+              <a:t>Our career field is huge and constantly changing.  No can be expected to know of remember everything.   </a:t>
+            </a:r>
+          </a:p>
+          <a:p>
+            <a:pPr marL="228600" indent="-228600">
+              <a:buAutoNum type="arabicPeriod"/>
+            </a:pPr>
+            <a:r>
+              <a:rPr lang="en-US" sz="1200" kern="1200" dirty="0">
+                <a:solidFill>
+                  <a:schemeClr val="tx1"/>
+                </a:solidFill>
+                <a:effectLst/>
+                <a:latin typeface="+mn-lt"/>
+                <a:ea typeface="+mn-ea"/>
+                <a:cs typeface="+mn-cs"/>
+              </a:rPr>
+              <a:t>Change the way you think about asking for help.  Instead look at it as a learning opportunity. </a:t>
+            </a:r>
+          </a:p>
+          <a:p>
+            <a:pPr marL="228600" indent="-228600">
+              <a:buAutoNum type="arabicPeriod"/>
+            </a:pPr>
+            <a:r>
+              <a:rPr lang="en-US" sz="1200" kern="1200" dirty="0">
+                <a:solidFill>
+                  <a:schemeClr val="tx1"/>
+                </a:solidFill>
+                <a:effectLst/>
+                <a:latin typeface="+mn-lt"/>
+                <a:ea typeface="+mn-ea"/>
+                <a:cs typeface="+mn-cs"/>
+              </a:rPr>
+              <a:t>You need to remember that not asking for help is a waste of your time.  </a:t>
+            </a:r>
+          </a:p>
+          <a:p>
+            <a:pPr marL="228600" indent="-228600">
+              <a:buAutoNum type="arabicPeriod"/>
+            </a:pPr>
+            <a:r>
+              <a:rPr lang="en-US" sz="1200" kern="1200" dirty="0">
+                <a:solidFill>
+                  <a:schemeClr val="tx1"/>
+                </a:solidFill>
+                <a:effectLst/>
+                <a:latin typeface="+mn-lt"/>
+                <a:ea typeface="+mn-ea"/>
+                <a:cs typeface="+mn-cs"/>
+              </a:rPr>
+              <a:t>It is good to work a problem as much as you can, but we all have hit that virtual wall.  You need to be able to recognize </a:t>
             </a:r>
             <a:endParaRPr lang="en-US" dirty="0"/>
           </a:p>
@@ -1822,6 +2189,9 @@
           <a:bodyPr/>
           <a:lstStyle/>
           <a:p>
+            <a:pPr marL="228600" indent="-228600">
+              <a:buAutoNum type="arabicPeriod"/>
+            </a:pPr>
             <a:r>
               <a:rPr lang="en-US" sz="1200" kern="1200" dirty="0">
                 <a:solidFill>
@@ -1832,7 +2202,58 @@
                 <a:ea typeface="+mn-ea"/>
                 <a:cs typeface="+mn-cs"/>
               </a:rPr>
-              <a:t>For our profession, this is not only a habit to have, but a necessary to be employable.  Things are always changing.  You need to find ways to keep learning.  It would be nice if worked paid and allow you to learn all kinds of new things, but that is rarely the case.  You must know that YOU are the only one responsible for your career.  Other can help, but it is all up to you.</a:t>
+              <a:t>For our profession, this is not only a habit to have, but a necessary to be employable.  </a:t>
+            </a:r>
+          </a:p>
+          <a:p>
+            <a:pPr marL="228600" indent="-228600">
+              <a:buAutoNum type="arabicPeriod"/>
+            </a:pPr>
+            <a:r>
+              <a:rPr lang="en-US" sz="1200" kern="1200" dirty="0">
+                <a:solidFill>
+                  <a:schemeClr val="tx1"/>
+                </a:solidFill>
+                <a:effectLst/>
+                <a:latin typeface="+mn-lt"/>
+                <a:ea typeface="+mn-ea"/>
+                <a:cs typeface="+mn-cs"/>
+              </a:rPr>
+              <a:t>Things are always changing.  You need to find ways to keep learning.  </a:t>
+            </a:r>
+          </a:p>
+          <a:p>
+            <a:pPr marL="228600" indent="-228600">
+              <a:buAutoNum type="arabicPeriod"/>
+            </a:pPr>
+            <a:r>
+              <a:rPr lang="en-US" sz="1200" kern="1200" dirty="0">
+                <a:solidFill>
+                  <a:schemeClr val="tx1"/>
+                </a:solidFill>
+                <a:effectLst/>
+                <a:latin typeface="+mn-lt"/>
+                <a:ea typeface="+mn-ea"/>
+                <a:cs typeface="+mn-cs"/>
+              </a:rPr>
+              <a:t>It would be nice if worked paid and allow you to learn all kinds of new things, but that is rarely the case.  </a:t>
+            </a:r>
+          </a:p>
+          <a:p>
+            <a:pPr marL="228600" indent="-228600">
+              <a:buAutoNum type="arabicPeriod"/>
+            </a:pPr>
+            <a:r>
+              <a:rPr lang="en-US" sz="1200" kern="1200" dirty="0">
+                <a:solidFill>
+                  <a:schemeClr val="tx1"/>
+                </a:solidFill>
+                <a:effectLst/>
+                <a:latin typeface="+mn-lt"/>
+                <a:ea typeface="+mn-ea"/>
+                <a:cs typeface="+mn-cs"/>
+              </a:rPr>
+              <a:t>You must know that YOU are the only one responsible for your career.  Other can help, but it is all up to you.</a:t>
             </a:r>
           </a:p>
           <a:p>
@@ -1864,7 +2285,9 @@
             </a:r>
           </a:p>
           <a:p>
-            <a:pPr lvl="0"/>
+            <a:pPr marL="228600" lvl="0" indent="-228600">
+              <a:buAutoNum type="alphaUcPeriod"/>
+            </a:pPr>
             <a:r>
               <a:rPr lang="en-US" sz="1200" kern="1200" dirty="0">
                 <a:solidFill>
@@ -1879,7 +2302,9 @@
             </a:r>
           </a:p>
           <a:p>
-            <a:pPr lvl="0"/>
+            <a:pPr marL="228600" lvl="0" indent="-228600">
+              <a:buAutoNum type="alphaUcPeriod"/>
+            </a:pPr>
             <a:r>
               <a:rPr lang="en-US" sz="1200" kern="1200" dirty="0">
                 <a:solidFill>
@@ -1894,7 +2319,9 @@
             </a:r>
           </a:p>
           <a:p>
-            <a:pPr lvl="0"/>
+            <a:pPr marL="228600" lvl="0" indent="-228600">
+              <a:buAutoNum type="alphaUcPeriod"/>
+            </a:pPr>
             <a:r>
               <a:rPr lang="en-US" sz="1200" kern="1200" dirty="0">
                 <a:solidFill>
@@ -1909,7 +2336,9 @@
             </a:r>
           </a:p>
           <a:p>
-            <a:pPr lvl="0"/>
+            <a:pPr marL="228600" lvl="0" indent="-228600">
+              <a:buAutoNum type="alphaUcPeriod"/>
+            </a:pPr>
             <a:r>
               <a:rPr lang="en-US" sz="1200" kern="1200" dirty="0">
                 <a:solidFill>
@@ -1924,7 +2353,9 @@
             </a:r>
           </a:p>
           <a:p>
-            <a:pPr lvl="0"/>
+            <a:pPr marL="228600" lvl="0" indent="-228600">
+              <a:buAutoNum type="alphaUcPeriod"/>
+            </a:pPr>
             <a:r>
               <a:rPr lang="en-US" sz="1200" kern="1200" dirty="0">
                 <a:solidFill>
@@ -1939,7 +2370,9 @@
             </a:r>
           </a:p>
           <a:p>
-            <a:pPr lvl="0"/>
+            <a:pPr marL="228600" lvl="0" indent="-228600">
+              <a:buAutoNum type="alphaUcPeriod"/>
+            </a:pPr>
             <a:r>
               <a:rPr lang="en-US" sz="1200" kern="1200" dirty="0">
                 <a:solidFill>
@@ -1954,7 +2387,9 @@
             </a:r>
           </a:p>
           <a:p>
-            <a:pPr lvl="0"/>
+            <a:pPr marL="228600" lvl="0" indent="-228600">
+              <a:buAutoNum type="alphaUcPeriod"/>
+            </a:pPr>
             <a:r>
               <a:rPr lang="en-US" sz="1200" kern="1200" dirty="0">
                 <a:solidFill>
@@ -1993,7 +2428,21 @@
                 <a:ea typeface="+mn-ea"/>
                 <a:cs typeface="+mn-cs"/>
               </a:rPr>
-              <a:t>Everyone learns differently, reading, doing, videos etc.  Find how you learn best and find instructors that you can relates to.  Pick things you are interested in and not just technology.</a:t>
+              <a:t>Everyone learns differently, reading, doing, videos etc.  Find how you learn best and find instructors that you can relates to.  </a:t>
+            </a:r>
+          </a:p>
+          <a:p>
+            <a:r>
+              <a:rPr lang="en-US" sz="1200" kern="1200" dirty="0">
+                <a:solidFill>
+                  <a:schemeClr val="tx1"/>
+                </a:solidFill>
+                <a:effectLst/>
+                <a:latin typeface="+mn-lt"/>
+                <a:ea typeface="+mn-ea"/>
+                <a:cs typeface="+mn-cs"/>
+              </a:rPr>
+              <a:t>Pick things you are interested in and not just technology.</a:t>
             </a:r>
           </a:p>
           <a:p>
@@ -2315,7 +2764,86 @@
                 <a:ea typeface="+mn-ea"/>
                 <a:cs typeface="+mn-cs"/>
               </a:rPr>
-              <a:t>This habit is good common sense, do not over work, spend time with your family and take vacations.  It is easier said than done.  </a:t>
+              <a:t>This habit is good common sense, </a:t>
+            </a:r>
+          </a:p>
+          <a:p>
+            <a:endParaRPr lang="en-US" sz="1200" kern="1200" dirty="0">
+              <a:solidFill>
+                <a:schemeClr val="tx1"/>
+              </a:solidFill>
+              <a:effectLst/>
+              <a:latin typeface="+mn-lt"/>
+              <a:ea typeface="+mn-ea"/>
+              <a:cs typeface="+mn-cs"/>
+            </a:endParaRPr>
+          </a:p>
+          <a:p>
+            <a:pPr marL="228600" indent="-228600">
+              <a:buAutoNum type="arabicPeriod"/>
+            </a:pPr>
+            <a:r>
+              <a:rPr lang="en-US" sz="1200" kern="1200" dirty="0">
+                <a:solidFill>
+                  <a:schemeClr val="tx1"/>
+                </a:solidFill>
+                <a:effectLst/>
+                <a:latin typeface="+mn-lt"/>
+                <a:ea typeface="+mn-ea"/>
+                <a:cs typeface="+mn-cs"/>
+              </a:rPr>
+              <a:t>do not over work, </a:t>
+            </a:r>
+          </a:p>
+          <a:p>
+            <a:pPr marL="228600" indent="-228600">
+              <a:buAutoNum type="arabicPeriod"/>
+            </a:pPr>
+            <a:r>
+              <a:rPr lang="en-US" sz="1200" kern="1200" dirty="0">
+                <a:solidFill>
+                  <a:schemeClr val="tx1"/>
+                </a:solidFill>
+                <a:effectLst/>
+                <a:latin typeface="+mn-lt"/>
+                <a:ea typeface="+mn-ea"/>
+                <a:cs typeface="+mn-cs"/>
+              </a:rPr>
+              <a:t>spend time with your family </a:t>
+            </a:r>
+          </a:p>
+          <a:p>
+            <a:pPr marL="228600" indent="-228600">
+              <a:buAutoNum type="arabicPeriod"/>
+            </a:pPr>
+            <a:r>
+              <a:rPr lang="en-US" sz="1200" kern="1200" dirty="0">
+                <a:solidFill>
+                  <a:schemeClr val="tx1"/>
+                </a:solidFill>
+                <a:effectLst/>
+                <a:latin typeface="+mn-lt"/>
+                <a:ea typeface="+mn-ea"/>
+                <a:cs typeface="+mn-cs"/>
+              </a:rPr>
+              <a:t>take vacations.  </a:t>
+            </a:r>
+          </a:p>
+          <a:p>
+            <a:pPr marL="228600" indent="-228600">
+              <a:buAutoNum type="arabicPeriod"/>
+            </a:pPr>
+            <a:r>
+              <a:rPr lang="en-US" sz="1200" kern="1200" dirty="0">
+                <a:solidFill>
+                  <a:schemeClr val="tx1"/>
+                </a:solidFill>
+                <a:effectLst/>
+                <a:latin typeface="+mn-lt"/>
+                <a:ea typeface="+mn-ea"/>
+                <a:cs typeface="+mn-cs"/>
+              </a:rPr>
+              <a:t>It is easier said than done.  </a:t>
             </a:r>
           </a:p>
           <a:p>
@@ -2553,7 +3081,57 @@
                 <a:ea typeface="+mn-ea"/>
                 <a:cs typeface="+mn-cs"/>
               </a:rPr>
-              <a:t>We all make mistakes, that is part of learning.  If you feel you do not make mistakes, then you are not pushing yourself.  You need to learn from your mistakes and avoid making the same mistake multiple times.</a:t>
+              <a:t>We all make mistakes, that is part of learning. </a:t>
+            </a:r>
+          </a:p>
+          <a:p>
+            <a:endParaRPr lang="en-US" sz="1200" kern="1200" dirty="0">
+              <a:solidFill>
+                <a:schemeClr val="tx1"/>
+              </a:solidFill>
+              <a:effectLst/>
+              <a:latin typeface="+mn-lt"/>
+              <a:ea typeface="+mn-ea"/>
+              <a:cs typeface="+mn-cs"/>
+            </a:endParaRPr>
+          </a:p>
+          <a:p>
+            <a:r>
+              <a:rPr lang="en-US" sz="1200" kern="1200" dirty="0">
+                <a:solidFill>
+                  <a:schemeClr val="tx1"/>
+                </a:solidFill>
+                <a:effectLst/>
+                <a:latin typeface="+mn-lt"/>
+                <a:ea typeface="+mn-ea"/>
+                <a:cs typeface="+mn-cs"/>
+              </a:rPr>
+              <a:t>If you feel you do not make mistakes, then you are not pushing yourself.  </a:t>
+            </a:r>
+          </a:p>
+          <a:p>
+            <a:endParaRPr lang="en-US" sz="1200" kern="1200" dirty="0">
+              <a:solidFill>
+                <a:schemeClr val="tx1"/>
+              </a:solidFill>
+              <a:effectLst/>
+              <a:latin typeface="+mn-lt"/>
+              <a:ea typeface="+mn-ea"/>
+              <a:cs typeface="+mn-cs"/>
+            </a:endParaRPr>
+          </a:p>
+          <a:p>
+            <a:r>
+              <a:rPr lang="en-US" sz="1200" kern="1200" dirty="0">
+                <a:solidFill>
+                  <a:schemeClr val="tx1"/>
+                </a:solidFill>
+                <a:effectLst/>
+                <a:latin typeface="+mn-lt"/>
+                <a:ea typeface="+mn-ea"/>
+                <a:cs typeface="+mn-cs"/>
+              </a:rPr>
+              <a:t>You need to learn from your mistakes and avoid making the same mistake multiple times.</a:t>
             </a:r>
           </a:p>
           <a:p>
@@ -5386,7 +5964,7 @@
           <a:p>
             <a:fld id="{8F9F391E-143D-F948-ADAE-29AEA3C1EBFB}" type="datetimeFigureOut">
               <a:rPr lang="en-US" smtClean="0"/>
-              <a:t>6/25/2020</a:t>
+              <a:t>6/26/2020</a:t>
             </a:fld>
             <a:endParaRPr lang="en-US" dirty="0"/>
           </a:p>
@@ -6006,7 +6584,7 @@
           <a:p>
             <a:fld id="{8F9F391E-143D-F948-ADAE-29AEA3C1EBFB}" type="datetimeFigureOut">
               <a:rPr lang="en-US" smtClean="0"/>
-              <a:t>6/25/2020</a:t>
+              <a:t>6/26/2020</a:t>
             </a:fld>
             <a:endParaRPr lang="en-US" dirty="0"/>
           </a:p>
@@ -6958,7 +7536,7 @@
           <a:p>
             <a:fld id="{8F9F391E-143D-F948-ADAE-29AEA3C1EBFB}" type="datetimeFigureOut">
               <a:rPr lang="en-US" smtClean="0"/>
-              <a:t>6/25/2020</a:t>
+              <a:t>6/26/2020</a:t>
             </a:fld>
             <a:endParaRPr lang="en-US" dirty="0"/>
           </a:p>
@@ -7664,7 +8242,7 @@
           <a:p>
             <a:fld id="{8F9F391E-143D-F948-ADAE-29AEA3C1EBFB}" type="datetimeFigureOut">
               <a:rPr lang="en-US" smtClean="0"/>
-              <a:t>6/25/2020</a:t>
+              <a:t>6/26/2020</a:t>
             </a:fld>
             <a:endParaRPr lang="en-US" dirty="0"/>
           </a:p>
@@ -9025,7 +9603,7 @@
           <a:p>
             <a:fld id="{8F9F391E-143D-F948-ADAE-29AEA3C1EBFB}" type="datetimeFigureOut">
               <a:rPr lang="en-US" smtClean="0"/>
-              <a:t>6/25/2020</a:t>
+              <a:t>6/26/2020</a:t>
             </a:fld>
             <a:endParaRPr lang="en-US" dirty="0"/>
           </a:p>
@@ -9426,7 +10004,7 @@
           <a:p>
             <a:fld id="{8F9F391E-143D-F948-ADAE-29AEA3C1EBFB}" type="datetimeFigureOut">
               <a:rPr lang="en-US" smtClean="0"/>
-              <a:t>6/25/2020</a:t>
+              <a:t>6/26/2020</a:t>
             </a:fld>
             <a:endParaRPr lang="en-US" dirty="0"/>
           </a:p>
@@ -9879,7 +10457,7 @@
           <a:p>
             <a:fld id="{8F9F391E-143D-F948-ADAE-29AEA3C1EBFB}" type="datetimeFigureOut">
               <a:rPr lang="en-US" smtClean="0"/>
-              <a:t>6/25/2020</a:t>
+              <a:t>6/26/2020</a:t>
             </a:fld>
             <a:endParaRPr lang="en-US" dirty="0"/>
           </a:p>
@@ -10293,7 +10871,7 @@
           <a:p>
             <a:fld id="{8F9F391E-143D-F948-ADAE-29AEA3C1EBFB}" type="datetimeFigureOut">
               <a:rPr lang="en-US" smtClean="0"/>
-              <a:t>6/25/2020</a:t>
+              <a:t>6/26/2020</a:t>
             </a:fld>
             <a:endParaRPr lang="en-US" dirty="0"/>
           </a:p>
@@ -12596,1861 +13174,6 @@
 </file>
 
 <file path=ppt/slideLayouts/slideLayout35.xml><?xml version="1.0" encoding="utf-8"?>
-<p:sldLayout xmlns:a="http://schemas.openxmlformats.org/drawingml/2006/main" xmlns:r="http://schemas.openxmlformats.org/officeDocument/2006/relationships" xmlns:p="http://schemas.openxmlformats.org/presentationml/2006/main" userDrawn="1">
-  <p:cSld name="Overview_1">
-    <p:spTree>
-      <p:nvGrpSpPr>
-        <p:cNvPr id="1" name=""/>
-        <p:cNvGrpSpPr/>
-        <p:nvPr/>
-      </p:nvGrpSpPr>
-      <p:grpSpPr>
-        <a:xfrm>
-          <a:off x="0" y="0"/>
-          <a:ext cx="0" cy="0"/>
-          <a:chOff x="0" y="0"/>
-          <a:chExt cx="0" cy="0"/>
-        </a:xfrm>
-      </p:grpSpPr>
-      <p:sp>
-        <p:nvSpPr>
-          <p:cNvPr id="3" name="Date Placeholder 2">
-            <a:extLst>
-              <a:ext uri="{FF2B5EF4-FFF2-40B4-BE49-F238E27FC236}">
-                <a16:creationId xmlns:a16="http://schemas.microsoft.com/office/drawing/2014/main" id="{2062DFD1-09C0-6845-8219-0846F32EDEFA}"/>
-              </a:ext>
-            </a:extLst>
-          </p:cNvPr>
-          <p:cNvSpPr>
-            <a:spLocks noGrp="1"/>
-          </p:cNvSpPr>
-          <p:nvPr>
-            <p:ph type="dt" sz="half" idx="10"/>
-          </p:nvPr>
-        </p:nvSpPr>
-        <p:spPr>
-          <a:xfrm>
-            <a:off x="838200" y="6356350"/>
-            <a:ext cx="2743200" cy="365125"/>
-          </a:xfrm>
-        </p:spPr>
-        <p:txBody>
-          <a:bodyPr/>
-          <a:lstStyle/>
-          <a:p>
-            <a:fld id="{8F9F391E-143D-F948-ADAE-29AEA3C1EBFB}" type="datetimeFigureOut">
-              <a:rPr lang="en-US" noProof="0" smtClean="0"/>
-              <a:t>6/25/2020</a:t>
-            </a:fld>
-            <a:endParaRPr lang="en-US" noProof="0" dirty="0"/>
-          </a:p>
-        </p:txBody>
-      </p:sp>
-      <p:sp>
-        <p:nvSpPr>
-          <p:cNvPr id="4" name="Footer Placeholder 3">
-            <a:extLst>
-              <a:ext uri="{FF2B5EF4-FFF2-40B4-BE49-F238E27FC236}">
-                <a16:creationId xmlns:a16="http://schemas.microsoft.com/office/drawing/2014/main" id="{CB7D7355-C4D0-1F4D-A365-E4AF1D8FED03}"/>
-              </a:ext>
-            </a:extLst>
-          </p:cNvPr>
-          <p:cNvSpPr>
-            <a:spLocks noGrp="1"/>
-          </p:cNvSpPr>
-          <p:nvPr>
-            <p:ph type="ftr" sz="quarter" idx="11"/>
-          </p:nvPr>
-        </p:nvSpPr>
-        <p:spPr/>
-        <p:txBody>
-          <a:bodyPr/>
-          <a:lstStyle/>
-          <a:p>
-            <a:endParaRPr lang="en-US" noProof="0" dirty="0"/>
-          </a:p>
-        </p:txBody>
-      </p:sp>
-      <p:sp>
-        <p:nvSpPr>
-          <p:cNvPr id="5" name="Slide Number Placeholder 4">
-            <a:extLst>
-              <a:ext uri="{FF2B5EF4-FFF2-40B4-BE49-F238E27FC236}">
-                <a16:creationId xmlns:a16="http://schemas.microsoft.com/office/drawing/2014/main" id="{A2771307-5F5C-D847-B837-8C60542C4B66}"/>
-              </a:ext>
-            </a:extLst>
-          </p:cNvPr>
-          <p:cNvSpPr>
-            <a:spLocks noGrp="1"/>
-          </p:cNvSpPr>
-          <p:nvPr>
-            <p:ph type="sldNum" sz="quarter" idx="12"/>
-          </p:nvPr>
-        </p:nvSpPr>
-        <p:spPr/>
-        <p:txBody>
-          <a:bodyPr/>
-          <a:lstStyle/>
-          <a:p>
-            <a:fld id="{31FEFF75-79D2-EE46-877B-299D1510E681}" type="slidenum">
-              <a:rPr lang="en-US" noProof="0" smtClean="0"/>
-              <a:t>‹#›</a:t>
-            </a:fld>
-            <a:endParaRPr lang="en-US" noProof="0" dirty="0"/>
-          </a:p>
-        </p:txBody>
-      </p:sp>
-      <p:sp>
-        <p:nvSpPr>
-          <p:cNvPr id="7" name="Title 1">
-            <a:extLst>
-              <a:ext uri="{FF2B5EF4-FFF2-40B4-BE49-F238E27FC236}">
-                <a16:creationId xmlns:a16="http://schemas.microsoft.com/office/drawing/2014/main" id="{9B04801C-3319-AC43-9484-8377A4F8F253}"/>
-              </a:ext>
-            </a:extLst>
-          </p:cNvPr>
-          <p:cNvSpPr>
-            <a:spLocks noGrp="1"/>
-          </p:cNvSpPr>
-          <p:nvPr>
-            <p:ph type="ctrTitle" hasCustomPrompt="1"/>
-          </p:nvPr>
-        </p:nvSpPr>
-        <p:spPr>
-          <a:xfrm>
-            <a:off x="1648661" y="339645"/>
-            <a:ext cx="10113030" cy="1002552"/>
-          </a:xfrm>
-        </p:spPr>
-        <p:txBody>
-          <a:bodyPr lIns="0" rIns="0" anchor="b">
-            <a:noAutofit/>
-          </a:bodyPr>
-          <a:lstStyle>
-            <a:lvl1pPr algn="l">
-              <a:defRPr sz="4500" b="0" i="0" cap="all" baseline="0">
-                <a:solidFill>
-                  <a:schemeClr val="accent4">
-                    <a:lumMod val="75000"/>
-                  </a:schemeClr>
-                </a:solidFill>
-                <a:latin typeface="Sagona ExtraLight" panose="02020303050505020204" pitchFamily="18" charset="0"/>
-              </a:defRPr>
-            </a:lvl1pPr>
-          </a:lstStyle>
-          <a:p>
-            <a:r>
-              <a:rPr lang="en-US" noProof="0"/>
-              <a:t>TITLE GOE HERE</a:t>
-            </a:r>
-          </a:p>
-        </p:txBody>
-      </p:sp>
-      <p:cxnSp>
-        <p:nvCxnSpPr>
-          <p:cNvPr id="13" name="Straight Connector 12">
-            <a:extLst>
-              <a:ext uri="{FF2B5EF4-FFF2-40B4-BE49-F238E27FC236}">
-                <a16:creationId xmlns:a16="http://schemas.microsoft.com/office/drawing/2014/main" id="{B781E455-9E6F-1B48-A537-F86699963276}"/>
-              </a:ext>
-            </a:extLst>
-          </p:cNvPr>
-          <p:cNvCxnSpPr>
-            <a:cxnSpLocks/>
-          </p:cNvCxnSpPr>
-          <p:nvPr userDrawn="1"/>
-        </p:nvCxnSpPr>
-        <p:spPr>
-          <a:xfrm>
-            <a:off x="392623" y="1342197"/>
-            <a:ext cx="0" cy="0"/>
-          </a:xfrm>
-          <a:prstGeom prst="line">
-            <a:avLst/>
-          </a:prstGeom>
-          <a:ln w="12700">
-            <a:solidFill>
-              <a:schemeClr val="tx1">
-                <a:lumMod val="85000"/>
-                <a:lumOff val="15000"/>
-              </a:schemeClr>
-            </a:solidFill>
-          </a:ln>
-        </p:spPr>
-        <p:style>
-          <a:lnRef idx="1">
-            <a:schemeClr val="accent1"/>
-          </a:lnRef>
-          <a:fillRef idx="0">
-            <a:schemeClr val="accent1"/>
-          </a:fillRef>
-          <a:effectRef idx="0">
-            <a:schemeClr val="accent1"/>
-          </a:effectRef>
-          <a:fontRef idx="minor">
-            <a:schemeClr val="tx1"/>
-          </a:fontRef>
-        </p:style>
-      </p:cxnSp>
-      <p:sp>
-        <p:nvSpPr>
-          <p:cNvPr id="12" name="Rectangle: Rounded Corners 16">
-            <a:extLst>
-              <a:ext uri="{FF2B5EF4-FFF2-40B4-BE49-F238E27FC236}">
-                <a16:creationId xmlns:a16="http://schemas.microsoft.com/office/drawing/2014/main" id="{B3776AA3-9860-D247-8A43-85FD58FFFD43}"/>
-              </a:ext>
-            </a:extLst>
-          </p:cNvPr>
-          <p:cNvSpPr/>
-          <p:nvPr/>
-        </p:nvSpPr>
-        <p:spPr>
-          <a:xfrm>
-            <a:off x="1658836" y="2294008"/>
-            <a:ext cx="506948" cy="506948"/>
-          </a:xfrm>
-          <a:prstGeom prst="roundRect">
-            <a:avLst/>
-          </a:prstGeom>
-          <a:noFill/>
-          <a:ln w="19050">
-            <a:solidFill>
-              <a:schemeClr val="tx1">
-                <a:lumMod val="85000"/>
-                <a:lumOff val="15000"/>
-              </a:schemeClr>
-            </a:solidFill>
-          </a:ln>
-        </p:spPr>
-        <p:style>
-          <a:lnRef idx="2">
-            <a:schemeClr val="accent1">
-              <a:shade val="50000"/>
-            </a:schemeClr>
-          </a:lnRef>
-          <a:fillRef idx="1">
-            <a:schemeClr val="accent1"/>
-          </a:fillRef>
-          <a:effectRef idx="0">
-            <a:schemeClr val="accent1"/>
-          </a:effectRef>
-          <a:fontRef idx="minor">
-            <a:schemeClr val="lt1"/>
-          </a:fontRef>
-        </p:style>
-        <p:txBody>
-          <a:bodyPr rtlCol="0" anchor="ctr"/>
-          <a:lstStyle/>
-          <a:p>
-            <a:pPr algn="ctr"/>
-            <a:endParaRPr lang="en-US" noProof="0" dirty="0"/>
-          </a:p>
-        </p:txBody>
-      </p:sp>
-      <p:sp>
-        <p:nvSpPr>
-          <p:cNvPr id="6" name="Picture Placeholder 5">
-            <a:extLst>
-              <a:ext uri="{FF2B5EF4-FFF2-40B4-BE49-F238E27FC236}">
-                <a16:creationId xmlns:a16="http://schemas.microsoft.com/office/drawing/2014/main" id="{7A07194D-FDC6-4941-AE99-5ED1F7F4C585}"/>
-              </a:ext>
-            </a:extLst>
-          </p:cNvPr>
-          <p:cNvSpPr>
-            <a:spLocks noGrp="1"/>
-          </p:cNvSpPr>
-          <p:nvPr>
-            <p:ph type="pic" sz="quarter" idx="13"/>
-          </p:nvPr>
-        </p:nvSpPr>
-        <p:spPr>
-          <a:xfrm>
-            <a:off x="1730896" y="2366353"/>
-            <a:ext cx="369944" cy="368788"/>
-          </a:xfrm>
-        </p:spPr>
-        <p:txBody>
-          <a:bodyPr anchor="ctr">
-            <a:normAutofit/>
-          </a:bodyPr>
-          <a:lstStyle>
-            <a:lvl1pPr marL="0" indent="0" algn="ctr">
-              <a:buNone/>
-              <a:defRPr sz="800"/>
-            </a:lvl1pPr>
-          </a:lstStyle>
-          <a:p>
-            <a:r>
-              <a:rPr lang="en-US" noProof="0" dirty="0"/>
-              <a:t>Click icon to add picture</a:t>
-            </a:r>
-          </a:p>
-        </p:txBody>
-      </p:sp>
-      <p:sp>
-        <p:nvSpPr>
-          <p:cNvPr id="57" name="Rectangle: Rounded Corners 16">
-            <a:extLst>
-              <a:ext uri="{FF2B5EF4-FFF2-40B4-BE49-F238E27FC236}">
-                <a16:creationId xmlns:a16="http://schemas.microsoft.com/office/drawing/2014/main" id="{F5244B71-4557-B64C-8C28-456C7623AE5B}"/>
-              </a:ext>
-            </a:extLst>
-          </p:cNvPr>
-          <p:cNvSpPr/>
-          <p:nvPr userDrawn="1"/>
-        </p:nvSpPr>
-        <p:spPr>
-          <a:xfrm>
-            <a:off x="1658836" y="3519693"/>
-            <a:ext cx="506948" cy="506948"/>
-          </a:xfrm>
-          <a:prstGeom prst="roundRect">
-            <a:avLst/>
-          </a:prstGeom>
-          <a:noFill/>
-          <a:ln w="19050">
-            <a:solidFill>
-              <a:schemeClr val="tx1">
-                <a:lumMod val="85000"/>
-                <a:lumOff val="15000"/>
-              </a:schemeClr>
-            </a:solidFill>
-          </a:ln>
-        </p:spPr>
-        <p:style>
-          <a:lnRef idx="2">
-            <a:schemeClr val="accent1">
-              <a:shade val="50000"/>
-            </a:schemeClr>
-          </a:lnRef>
-          <a:fillRef idx="1">
-            <a:schemeClr val="accent1"/>
-          </a:fillRef>
-          <a:effectRef idx="0">
-            <a:schemeClr val="accent1"/>
-          </a:effectRef>
-          <a:fontRef idx="minor">
-            <a:schemeClr val="lt1"/>
-          </a:fontRef>
-        </p:style>
-        <p:txBody>
-          <a:bodyPr rtlCol="0" anchor="ctr"/>
-          <a:lstStyle/>
-          <a:p>
-            <a:pPr algn="ctr"/>
-            <a:endParaRPr lang="en-US" noProof="0" dirty="0"/>
-          </a:p>
-        </p:txBody>
-      </p:sp>
-      <p:sp>
-        <p:nvSpPr>
-          <p:cNvPr id="58" name="Picture Placeholder 5">
-            <a:extLst>
-              <a:ext uri="{FF2B5EF4-FFF2-40B4-BE49-F238E27FC236}">
-                <a16:creationId xmlns:a16="http://schemas.microsoft.com/office/drawing/2014/main" id="{B12F4613-2BD8-E54D-A2E0-8707A28A10A4}"/>
-              </a:ext>
-            </a:extLst>
-          </p:cNvPr>
-          <p:cNvSpPr>
-            <a:spLocks noGrp="1"/>
-          </p:cNvSpPr>
-          <p:nvPr>
-            <p:ph type="pic" sz="quarter" idx="14"/>
-          </p:nvPr>
-        </p:nvSpPr>
-        <p:spPr>
-          <a:xfrm>
-            <a:off x="1730896" y="3592038"/>
-            <a:ext cx="369944" cy="368788"/>
-          </a:xfrm>
-        </p:spPr>
-        <p:txBody>
-          <a:bodyPr anchor="ctr">
-            <a:normAutofit/>
-          </a:bodyPr>
-          <a:lstStyle>
-            <a:lvl1pPr marL="0" indent="0" algn="ctr">
-              <a:buNone/>
-              <a:defRPr sz="800"/>
-            </a:lvl1pPr>
-          </a:lstStyle>
-          <a:p>
-            <a:r>
-              <a:rPr lang="en-US" noProof="0" dirty="0"/>
-              <a:t>Click icon to add picture</a:t>
-            </a:r>
-          </a:p>
-        </p:txBody>
-      </p:sp>
-      <p:sp>
-        <p:nvSpPr>
-          <p:cNvPr id="61" name="Rectangle: Rounded Corners 16">
-            <a:extLst>
-              <a:ext uri="{FF2B5EF4-FFF2-40B4-BE49-F238E27FC236}">
-                <a16:creationId xmlns:a16="http://schemas.microsoft.com/office/drawing/2014/main" id="{1A5F3004-02A9-1E43-A3E5-8ABCD5ED1A1C}"/>
-              </a:ext>
-            </a:extLst>
-          </p:cNvPr>
-          <p:cNvSpPr/>
-          <p:nvPr userDrawn="1"/>
-        </p:nvSpPr>
-        <p:spPr>
-          <a:xfrm>
-            <a:off x="1658836" y="4784289"/>
-            <a:ext cx="506948" cy="506948"/>
-          </a:xfrm>
-          <a:prstGeom prst="roundRect">
-            <a:avLst/>
-          </a:prstGeom>
-          <a:noFill/>
-          <a:ln w="19050">
-            <a:solidFill>
-              <a:schemeClr val="tx1">
-                <a:lumMod val="85000"/>
-                <a:lumOff val="15000"/>
-              </a:schemeClr>
-            </a:solidFill>
-          </a:ln>
-        </p:spPr>
-        <p:style>
-          <a:lnRef idx="2">
-            <a:schemeClr val="accent1">
-              <a:shade val="50000"/>
-            </a:schemeClr>
-          </a:lnRef>
-          <a:fillRef idx="1">
-            <a:schemeClr val="accent1"/>
-          </a:fillRef>
-          <a:effectRef idx="0">
-            <a:schemeClr val="accent1"/>
-          </a:effectRef>
-          <a:fontRef idx="minor">
-            <a:schemeClr val="lt1"/>
-          </a:fontRef>
-        </p:style>
-        <p:txBody>
-          <a:bodyPr rtlCol="0" anchor="ctr"/>
-          <a:lstStyle/>
-          <a:p>
-            <a:pPr algn="ctr"/>
-            <a:endParaRPr lang="en-US" noProof="0" dirty="0"/>
-          </a:p>
-        </p:txBody>
-      </p:sp>
-      <p:sp>
-        <p:nvSpPr>
-          <p:cNvPr id="62" name="Picture Placeholder 5">
-            <a:extLst>
-              <a:ext uri="{FF2B5EF4-FFF2-40B4-BE49-F238E27FC236}">
-                <a16:creationId xmlns:a16="http://schemas.microsoft.com/office/drawing/2014/main" id="{1A844DD7-EE1E-F04F-91C7-38039BFF2046}"/>
-              </a:ext>
-            </a:extLst>
-          </p:cNvPr>
-          <p:cNvSpPr>
-            <a:spLocks noGrp="1"/>
-          </p:cNvSpPr>
-          <p:nvPr>
-            <p:ph type="pic" sz="quarter" idx="15"/>
-          </p:nvPr>
-        </p:nvSpPr>
-        <p:spPr>
-          <a:xfrm>
-            <a:off x="1730896" y="4856634"/>
-            <a:ext cx="369944" cy="368788"/>
-          </a:xfrm>
-        </p:spPr>
-        <p:txBody>
-          <a:bodyPr anchor="ctr">
-            <a:normAutofit/>
-          </a:bodyPr>
-          <a:lstStyle>
-            <a:lvl1pPr marL="0" indent="0" algn="ctr">
-              <a:buNone/>
-              <a:defRPr sz="800"/>
-            </a:lvl1pPr>
-          </a:lstStyle>
-          <a:p>
-            <a:r>
-              <a:rPr lang="en-US" noProof="0" dirty="0"/>
-              <a:t>Click icon to add picture</a:t>
-            </a:r>
-          </a:p>
-        </p:txBody>
-      </p:sp>
-      <p:sp>
-        <p:nvSpPr>
-          <p:cNvPr id="98" name="Rectangle: Rounded Corners 16">
-            <a:extLst>
-              <a:ext uri="{FF2B5EF4-FFF2-40B4-BE49-F238E27FC236}">
-                <a16:creationId xmlns:a16="http://schemas.microsoft.com/office/drawing/2014/main" id="{491E125D-06D1-A343-A3C9-CBC63A66CDC0}"/>
-              </a:ext>
-            </a:extLst>
-          </p:cNvPr>
-          <p:cNvSpPr/>
-          <p:nvPr userDrawn="1"/>
-        </p:nvSpPr>
-        <p:spPr>
-          <a:xfrm>
-            <a:off x="6871764" y="2294008"/>
-            <a:ext cx="506948" cy="506948"/>
-          </a:xfrm>
-          <a:prstGeom prst="roundRect">
-            <a:avLst/>
-          </a:prstGeom>
-          <a:noFill/>
-          <a:ln w="19050">
-            <a:solidFill>
-              <a:schemeClr val="tx1">
-                <a:lumMod val="85000"/>
-                <a:lumOff val="15000"/>
-              </a:schemeClr>
-            </a:solidFill>
-          </a:ln>
-        </p:spPr>
-        <p:style>
-          <a:lnRef idx="2">
-            <a:schemeClr val="accent1">
-              <a:shade val="50000"/>
-            </a:schemeClr>
-          </a:lnRef>
-          <a:fillRef idx="1">
-            <a:schemeClr val="accent1"/>
-          </a:fillRef>
-          <a:effectRef idx="0">
-            <a:schemeClr val="accent1"/>
-          </a:effectRef>
-          <a:fontRef idx="minor">
-            <a:schemeClr val="lt1"/>
-          </a:fontRef>
-        </p:style>
-        <p:txBody>
-          <a:bodyPr rtlCol="0" anchor="ctr"/>
-          <a:lstStyle/>
-          <a:p>
-            <a:pPr algn="ctr"/>
-            <a:endParaRPr lang="en-US" noProof="0" dirty="0"/>
-          </a:p>
-        </p:txBody>
-      </p:sp>
-      <p:sp>
-        <p:nvSpPr>
-          <p:cNvPr id="99" name="Picture Placeholder 5">
-            <a:extLst>
-              <a:ext uri="{FF2B5EF4-FFF2-40B4-BE49-F238E27FC236}">
-                <a16:creationId xmlns:a16="http://schemas.microsoft.com/office/drawing/2014/main" id="{26670858-0422-9546-B0BD-9B2D594140BA}"/>
-              </a:ext>
-            </a:extLst>
-          </p:cNvPr>
-          <p:cNvSpPr>
-            <a:spLocks noGrp="1"/>
-          </p:cNvSpPr>
-          <p:nvPr>
-            <p:ph type="pic" sz="quarter" idx="21"/>
-          </p:nvPr>
-        </p:nvSpPr>
-        <p:spPr>
-          <a:xfrm>
-            <a:off x="6949266" y="2366353"/>
-            <a:ext cx="369944" cy="368788"/>
-          </a:xfrm>
-        </p:spPr>
-        <p:txBody>
-          <a:bodyPr anchor="ctr">
-            <a:normAutofit/>
-          </a:bodyPr>
-          <a:lstStyle>
-            <a:lvl1pPr marL="0" indent="0" algn="ctr">
-              <a:buNone/>
-              <a:defRPr sz="800"/>
-            </a:lvl1pPr>
-          </a:lstStyle>
-          <a:p>
-            <a:r>
-              <a:rPr lang="en-US" noProof="0" dirty="0"/>
-              <a:t>Click icon to add picture</a:t>
-            </a:r>
-          </a:p>
-        </p:txBody>
-      </p:sp>
-      <p:sp>
-        <p:nvSpPr>
-          <p:cNvPr id="100" name="Rectangle: Rounded Corners 16">
-            <a:extLst>
-              <a:ext uri="{FF2B5EF4-FFF2-40B4-BE49-F238E27FC236}">
-                <a16:creationId xmlns:a16="http://schemas.microsoft.com/office/drawing/2014/main" id="{9DDF7684-5C6D-B344-A059-87C2BDD8657A}"/>
-              </a:ext>
-            </a:extLst>
-          </p:cNvPr>
-          <p:cNvSpPr/>
-          <p:nvPr userDrawn="1"/>
-        </p:nvSpPr>
-        <p:spPr>
-          <a:xfrm>
-            <a:off x="6877206" y="3519693"/>
-            <a:ext cx="506948" cy="506948"/>
-          </a:xfrm>
-          <a:prstGeom prst="roundRect">
-            <a:avLst/>
-          </a:prstGeom>
-          <a:noFill/>
-          <a:ln w="19050">
-            <a:solidFill>
-              <a:schemeClr val="tx1">
-                <a:lumMod val="85000"/>
-                <a:lumOff val="15000"/>
-              </a:schemeClr>
-            </a:solidFill>
-          </a:ln>
-        </p:spPr>
-        <p:style>
-          <a:lnRef idx="2">
-            <a:schemeClr val="accent1">
-              <a:shade val="50000"/>
-            </a:schemeClr>
-          </a:lnRef>
-          <a:fillRef idx="1">
-            <a:schemeClr val="accent1"/>
-          </a:fillRef>
-          <a:effectRef idx="0">
-            <a:schemeClr val="accent1"/>
-          </a:effectRef>
-          <a:fontRef idx="minor">
-            <a:schemeClr val="lt1"/>
-          </a:fontRef>
-        </p:style>
-        <p:txBody>
-          <a:bodyPr rtlCol="0" anchor="ctr"/>
-          <a:lstStyle/>
-          <a:p>
-            <a:pPr algn="ctr"/>
-            <a:endParaRPr lang="en-US" noProof="0" dirty="0"/>
-          </a:p>
-        </p:txBody>
-      </p:sp>
-      <p:sp>
-        <p:nvSpPr>
-          <p:cNvPr id="101" name="Picture Placeholder 5">
-            <a:extLst>
-              <a:ext uri="{FF2B5EF4-FFF2-40B4-BE49-F238E27FC236}">
-                <a16:creationId xmlns:a16="http://schemas.microsoft.com/office/drawing/2014/main" id="{72578CBB-F47F-C740-982B-BA1719663CCD}"/>
-              </a:ext>
-            </a:extLst>
-          </p:cNvPr>
-          <p:cNvSpPr>
-            <a:spLocks noGrp="1"/>
-          </p:cNvSpPr>
-          <p:nvPr>
-            <p:ph type="pic" sz="quarter" idx="22"/>
-          </p:nvPr>
-        </p:nvSpPr>
-        <p:spPr>
-          <a:xfrm>
-            <a:off x="6949266" y="3592038"/>
-            <a:ext cx="369944" cy="368788"/>
-          </a:xfrm>
-        </p:spPr>
-        <p:txBody>
-          <a:bodyPr anchor="ctr">
-            <a:normAutofit/>
-          </a:bodyPr>
-          <a:lstStyle>
-            <a:lvl1pPr marL="0" indent="0" algn="ctr">
-              <a:buNone/>
-              <a:defRPr sz="800"/>
-            </a:lvl1pPr>
-          </a:lstStyle>
-          <a:p>
-            <a:r>
-              <a:rPr lang="en-US" noProof="0" dirty="0"/>
-              <a:t>Click icon to add picture</a:t>
-            </a:r>
-          </a:p>
-        </p:txBody>
-      </p:sp>
-      <p:sp>
-        <p:nvSpPr>
-          <p:cNvPr id="102" name="Rectangle: Rounded Corners 16">
-            <a:extLst>
-              <a:ext uri="{FF2B5EF4-FFF2-40B4-BE49-F238E27FC236}">
-                <a16:creationId xmlns:a16="http://schemas.microsoft.com/office/drawing/2014/main" id="{FE14D617-9285-9D4D-84E4-7BBD145B397E}"/>
-              </a:ext>
-            </a:extLst>
-          </p:cNvPr>
-          <p:cNvSpPr/>
-          <p:nvPr userDrawn="1"/>
-        </p:nvSpPr>
-        <p:spPr>
-          <a:xfrm>
-            <a:off x="6877206" y="4784289"/>
-            <a:ext cx="506948" cy="506948"/>
-          </a:xfrm>
-          <a:prstGeom prst="roundRect">
-            <a:avLst/>
-          </a:prstGeom>
-          <a:noFill/>
-          <a:ln w="19050">
-            <a:solidFill>
-              <a:schemeClr val="tx1">
-                <a:lumMod val="85000"/>
-                <a:lumOff val="15000"/>
-              </a:schemeClr>
-            </a:solidFill>
-          </a:ln>
-        </p:spPr>
-        <p:style>
-          <a:lnRef idx="2">
-            <a:schemeClr val="accent1">
-              <a:shade val="50000"/>
-            </a:schemeClr>
-          </a:lnRef>
-          <a:fillRef idx="1">
-            <a:schemeClr val="accent1"/>
-          </a:fillRef>
-          <a:effectRef idx="0">
-            <a:schemeClr val="accent1"/>
-          </a:effectRef>
-          <a:fontRef idx="minor">
-            <a:schemeClr val="lt1"/>
-          </a:fontRef>
-        </p:style>
-        <p:txBody>
-          <a:bodyPr rtlCol="0" anchor="ctr"/>
-          <a:lstStyle/>
-          <a:p>
-            <a:pPr algn="ctr"/>
-            <a:endParaRPr lang="en-US" noProof="0" dirty="0"/>
-          </a:p>
-        </p:txBody>
-      </p:sp>
-      <p:sp>
-        <p:nvSpPr>
-          <p:cNvPr id="103" name="Picture Placeholder 5">
-            <a:extLst>
-              <a:ext uri="{FF2B5EF4-FFF2-40B4-BE49-F238E27FC236}">
-                <a16:creationId xmlns:a16="http://schemas.microsoft.com/office/drawing/2014/main" id="{32A1D8CC-0021-A243-9775-CF930D41B94D}"/>
-              </a:ext>
-            </a:extLst>
-          </p:cNvPr>
-          <p:cNvSpPr>
-            <a:spLocks noGrp="1"/>
-          </p:cNvSpPr>
-          <p:nvPr>
-            <p:ph type="pic" sz="quarter" idx="23"/>
-          </p:nvPr>
-        </p:nvSpPr>
-        <p:spPr>
-          <a:xfrm>
-            <a:off x="6949266" y="4856634"/>
-            <a:ext cx="369944" cy="368788"/>
-          </a:xfrm>
-        </p:spPr>
-        <p:txBody>
-          <a:bodyPr anchor="ctr">
-            <a:normAutofit/>
-          </a:bodyPr>
-          <a:lstStyle>
-            <a:lvl1pPr marL="0" indent="0" algn="ctr">
-              <a:buNone/>
-              <a:defRPr sz="800"/>
-            </a:lvl1pPr>
-          </a:lstStyle>
-          <a:p>
-            <a:r>
-              <a:rPr lang="en-US" noProof="0" dirty="0"/>
-              <a:t>Click icon to add picture</a:t>
-            </a:r>
-          </a:p>
-        </p:txBody>
-      </p:sp>
-      <p:sp>
-        <p:nvSpPr>
-          <p:cNvPr id="107" name="Text Placeholder 10">
-            <a:extLst>
-              <a:ext uri="{FF2B5EF4-FFF2-40B4-BE49-F238E27FC236}">
-                <a16:creationId xmlns:a16="http://schemas.microsoft.com/office/drawing/2014/main" id="{8867B6C6-0A29-A04E-BAE5-B9060225E124}"/>
-              </a:ext>
-            </a:extLst>
-          </p:cNvPr>
-          <p:cNvSpPr>
-            <a:spLocks noGrp="1"/>
-          </p:cNvSpPr>
-          <p:nvPr>
-            <p:ph type="body" sz="quarter" idx="25"/>
-          </p:nvPr>
-        </p:nvSpPr>
-        <p:spPr>
-          <a:xfrm>
-            <a:off x="2488785" y="2512451"/>
-            <a:ext cx="3995035" cy="426685"/>
-          </a:xfrm>
-        </p:spPr>
-        <p:txBody>
-          <a:bodyPr lIns="0" rIns="0" anchor="t">
-            <a:noAutofit/>
-          </a:bodyPr>
-          <a:lstStyle>
-            <a:lvl1pPr marL="0" indent="0">
-              <a:lnSpc>
-                <a:spcPct val="100000"/>
-              </a:lnSpc>
-              <a:buNone/>
-              <a:defRPr sz="1400">
-                <a:solidFill>
-                  <a:schemeClr val="tx1"/>
-                </a:solidFill>
-                <a:latin typeface="+mj-lt"/>
-              </a:defRPr>
-            </a:lvl1pPr>
-            <a:lvl2pPr marL="457200" indent="0">
-              <a:lnSpc>
-                <a:spcPct val="100000"/>
-              </a:lnSpc>
-              <a:buNone/>
-              <a:defRPr sz="900">
-                <a:solidFill>
-                  <a:schemeClr val="tx1"/>
-                </a:solidFill>
-                <a:latin typeface="Speak Pro" panose="020B0504020101020102" pitchFamily="34" charset="0"/>
-              </a:defRPr>
-            </a:lvl2pPr>
-            <a:lvl3pPr marL="914400" indent="0">
-              <a:lnSpc>
-                <a:spcPct val="100000"/>
-              </a:lnSpc>
-              <a:buNone/>
-              <a:defRPr sz="900">
-                <a:solidFill>
-                  <a:schemeClr val="tx1"/>
-                </a:solidFill>
-                <a:latin typeface="Speak Pro" panose="020B0504020101020102" pitchFamily="34" charset="0"/>
-              </a:defRPr>
-            </a:lvl3pPr>
-            <a:lvl4pPr marL="1371600" indent="0">
-              <a:lnSpc>
-                <a:spcPct val="100000"/>
-              </a:lnSpc>
-              <a:buNone/>
-              <a:defRPr sz="900">
-                <a:solidFill>
-                  <a:schemeClr val="tx1"/>
-                </a:solidFill>
-                <a:latin typeface="Speak Pro" panose="020B0504020101020102" pitchFamily="34" charset="0"/>
-              </a:defRPr>
-            </a:lvl4pPr>
-            <a:lvl5pPr marL="1828800" indent="0">
-              <a:lnSpc>
-                <a:spcPct val="100000"/>
-              </a:lnSpc>
-              <a:buNone/>
-              <a:defRPr sz="900">
-                <a:solidFill>
-                  <a:schemeClr val="tx1"/>
-                </a:solidFill>
-                <a:latin typeface="Speak Pro" panose="020B0504020101020102" pitchFamily="34" charset="0"/>
-              </a:defRPr>
-            </a:lvl5pPr>
-          </a:lstStyle>
-          <a:p>
-            <a:pPr lvl="0"/>
-            <a:r>
-              <a:rPr lang="en-US" noProof="0"/>
-              <a:t>Click to edit Master text styles</a:t>
-            </a:r>
-          </a:p>
-        </p:txBody>
-      </p:sp>
-      <p:sp>
-        <p:nvSpPr>
-          <p:cNvPr id="109" name="Text Placeholder 2">
-            <a:extLst>
-              <a:ext uri="{FF2B5EF4-FFF2-40B4-BE49-F238E27FC236}">
-                <a16:creationId xmlns:a16="http://schemas.microsoft.com/office/drawing/2014/main" id="{9DF49D7C-2E08-9348-9C2B-0496EF9612DF}"/>
-              </a:ext>
-            </a:extLst>
-          </p:cNvPr>
-          <p:cNvSpPr>
-            <a:spLocks noGrp="1"/>
-          </p:cNvSpPr>
-          <p:nvPr>
-            <p:ph type="body" idx="26"/>
-          </p:nvPr>
-        </p:nvSpPr>
-        <p:spPr>
-          <a:xfrm>
-            <a:off x="2488784" y="2265592"/>
-            <a:ext cx="3995036" cy="365095"/>
-          </a:xfrm>
-        </p:spPr>
-        <p:txBody>
-          <a:bodyPr lIns="0" anchor="b">
-            <a:noAutofit/>
-          </a:bodyPr>
-          <a:lstStyle>
-            <a:lvl1pPr marL="0" indent="0">
-              <a:buNone/>
-              <a:defRPr sz="1800" b="1" cap="all" baseline="0">
-                <a:latin typeface="Speak Pro" panose="020B0504020101020102" pitchFamily="34" charset="0"/>
-              </a:defRPr>
-            </a:lvl1pPr>
-            <a:lvl2pPr marL="457200" indent="0">
-              <a:buNone/>
-              <a:defRPr sz="2000" b="1"/>
-            </a:lvl2pPr>
-            <a:lvl3pPr marL="914400" indent="0">
-              <a:buNone/>
-              <a:defRPr sz="1800" b="1"/>
-            </a:lvl3pPr>
-            <a:lvl4pPr marL="1371600" indent="0">
-              <a:buNone/>
-              <a:defRPr sz="1600" b="1"/>
-            </a:lvl4pPr>
-            <a:lvl5pPr marL="1828800" indent="0">
-              <a:buNone/>
-              <a:defRPr sz="1600" b="1"/>
-            </a:lvl5pPr>
-            <a:lvl6pPr marL="2286000" indent="0">
-              <a:buNone/>
-              <a:defRPr sz="1600" b="1"/>
-            </a:lvl6pPr>
-            <a:lvl7pPr marL="2743200" indent="0">
-              <a:buNone/>
-              <a:defRPr sz="1600" b="1"/>
-            </a:lvl7pPr>
-            <a:lvl8pPr marL="3200400" indent="0">
-              <a:buNone/>
-              <a:defRPr sz="1600" b="1"/>
-            </a:lvl8pPr>
-            <a:lvl9pPr marL="3657600" indent="0">
-              <a:buNone/>
-              <a:defRPr sz="1600" b="1"/>
-            </a:lvl9pPr>
-          </a:lstStyle>
-          <a:p>
-            <a:pPr lvl="0"/>
-            <a:r>
-              <a:rPr lang="en-US" noProof="0"/>
-              <a:t>Click to edit Master text styles</a:t>
-            </a:r>
-          </a:p>
-        </p:txBody>
-      </p:sp>
-      <p:sp>
-        <p:nvSpPr>
-          <p:cNvPr id="110" name="Text Placeholder 10">
-            <a:extLst>
-              <a:ext uri="{FF2B5EF4-FFF2-40B4-BE49-F238E27FC236}">
-                <a16:creationId xmlns:a16="http://schemas.microsoft.com/office/drawing/2014/main" id="{2733402A-D14F-6D48-A59D-329C3824DD2E}"/>
-              </a:ext>
-            </a:extLst>
-          </p:cNvPr>
-          <p:cNvSpPr>
-            <a:spLocks noGrp="1"/>
-          </p:cNvSpPr>
-          <p:nvPr>
-            <p:ph type="body" sz="quarter" idx="27"/>
-          </p:nvPr>
-        </p:nvSpPr>
-        <p:spPr>
-          <a:xfrm>
-            <a:off x="2488785" y="3745506"/>
-            <a:ext cx="3995035" cy="426685"/>
-          </a:xfrm>
-        </p:spPr>
-        <p:txBody>
-          <a:bodyPr lIns="0" rIns="0" anchor="t">
-            <a:noAutofit/>
-          </a:bodyPr>
-          <a:lstStyle>
-            <a:lvl1pPr marL="0" indent="0">
-              <a:lnSpc>
-                <a:spcPct val="100000"/>
-              </a:lnSpc>
-              <a:buNone/>
-              <a:defRPr sz="1400">
-                <a:solidFill>
-                  <a:schemeClr val="tx1"/>
-                </a:solidFill>
-                <a:latin typeface="+mj-lt"/>
-              </a:defRPr>
-            </a:lvl1pPr>
-            <a:lvl2pPr marL="457200" indent="0">
-              <a:lnSpc>
-                <a:spcPct val="100000"/>
-              </a:lnSpc>
-              <a:buNone/>
-              <a:defRPr sz="900">
-                <a:solidFill>
-                  <a:schemeClr val="tx1"/>
-                </a:solidFill>
-                <a:latin typeface="Speak Pro" panose="020B0504020101020102" pitchFamily="34" charset="0"/>
-              </a:defRPr>
-            </a:lvl2pPr>
-            <a:lvl3pPr marL="914400" indent="0">
-              <a:lnSpc>
-                <a:spcPct val="100000"/>
-              </a:lnSpc>
-              <a:buNone/>
-              <a:defRPr sz="900">
-                <a:solidFill>
-                  <a:schemeClr val="tx1"/>
-                </a:solidFill>
-                <a:latin typeface="Speak Pro" panose="020B0504020101020102" pitchFamily="34" charset="0"/>
-              </a:defRPr>
-            </a:lvl3pPr>
-            <a:lvl4pPr marL="1371600" indent="0">
-              <a:lnSpc>
-                <a:spcPct val="100000"/>
-              </a:lnSpc>
-              <a:buNone/>
-              <a:defRPr sz="900">
-                <a:solidFill>
-                  <a:schemeClr val="tx1"/>
-                </a:solidFill>
-                <a:latin typeface="Speak Pro" panose="020B0504020101020102" pitchFamily="34" charset="0"/>
-              </a:defRPr>
-            </a:lvl4pPr>
-            <a:lvl5pPr marL="1828800" indent="0">
-              <a:lnSpc>
-                <a:spcPct val="100000"/>
-              </a:lnSpc>
-              <a:buNone/>
-              <a:defRPr sz="900">
-                <a:solidFill>
-                  <a:schemeClr val="tx1"/>
-                </a:solidFill>
-                <a:latin typeface="Speak Pro" panose="020B0504020101020102" pitchFamily="34" charset="0"/>
-              </a:defRPr>
-            </a:lvl5pPr>
-          </a:lstStyle>
-          <a:p>
-            <a:pPr lvl="0"/>
-            <a:r>
-              <a:rPr lang="en-US" noProof="0"/>
-              <a:t>Click to edit Master text styles</a:t>
-            </a:r>
-          </a:p>
-        </p:txBody>
-      </p:sp>
-      <p:sp>
-        <p:nvSpPr>
-          <p:cNvPr id="111" name="Text Placeholder 2">
-            <a:extLst>
-              <a:ext uri="{FF2B5EF4-FFF2-40B4-BE49-F238E27FC236}">
-                <a16:creationId xmlns:a16="http://schemas.microsoft.com/office/drawing/2014/main" id="{3886AD51-641D-6B44-B558-2B15E88D1BC5}"/>
-              </a:ext>
-            </a:extLst>
-          </p:cNvPr>
-          <p:cNvSpPr>
-            <a:spLocks noGrp="1"/>
-          </p:cNvSpPr>
-          <p:nvPr>
-            <p:ph type="body" idx="28"/>
-          </p:nvPr>
-        </p:nvSpPr>
-        <p:spPr>
-          <a:xfrm>
-            <a:off x="2488784" y="3498647"/>
-            <a:ext cx="3995036" cy="365095"/>
-          </a:xfrm>
-        </p:spPr>
-        <p:txBody>
-          <a:bodyPr lIns="0" anchor="b">
-            <a:noAutofit/>
-          </a:bodyPr>
-          <a:lstStyle>
-            <a:lvl1pPr marL="0" indent="0">
-              <a:buNone/>
-              <a:defRPr sz="1800" b="1" cap="all" baseline="0">
-                <a:latin typeface="Speak Pro" panose="020B0504020101020102" pitchFamily="34" charset="0"/>
-              </a:defRPr>
-            </a:lvl1pPr>
-            <a:lvl2pPr marL="457200" indent="0">
-              <a:buNone/>
-              <a:defRPr sz="2000" b="1"/>
-            </a:lvl2pPr>
-            <a:lvl3pPr marL="914400" indent="0">
-              <a:buNone/>
-              <a:defRPr sz="1800" b="1"/>
-            </a:lvl3pPr>
-            <a:lvl4pPr marL="1371600" indent="0">
-              <a:buNone/>
-              <a:defRPr sz="1600" b="1"/>
-            </a:lvl4pPr>
-            <a:lvl5pPr marL="1828800" indent="0">
-              <a:buNone/>
-              <a:defRPr sz="1600" b="1"/>
-            </a:lvl5pPr>
-            <a:lvl6pPr marL="2286000" indent="0">
-              <a:buNone/>
-              <a:defRPr sz="1600" b="1"/>
-            </a:lvl6pPr>
-            <a:lvl7pPr marL="2743200" indent="0">
-              <a:buNone/>
-              <a:defRPr sz="1600" b="1"/>
-            </a:lvl7pPr>
-            <a:lvl8pPr marL="3200400" indent="0">
-              <a:buNone/>
-              <a:defRPr sz="1600" b="1"/>
-            </a:lvl8pPr>
-            <a:lvl9pPr marL="3657600" indent="0">
-              <a:buNone/>
-              <a:defRPr sz="1600" b="1"/>
-            </a:lvl9pPr>
-          </a:lstStyle>
-          <a:p>
-            <a:pPr lvl="0"/>
-            <a:r>
-              <a:rPr lang="en-US" noProof="0"/>
-              <a:t>Click to edit Master text styles</a:t>
-            </a:r>
-          </a:p>
-        </p:txBody>
-      </p:sp>
-      <p:sp>
-        <p:nvSpPr>
-          <p:cNvPr id="112" name="Text Placeholder 10">
-            <a:extLst>
-              <a:ext uri="{FF2B5EF4-FFF2-40B4-BE49-F238E27FC236}">
-                <a16:creationId xmlns:a16="http://schemas.microsoft.com/office/drawing/2014/main" id="{C00297CA-1F0B-4C44-852F-CF6FEA9F9481}"/>
-              </a:ext>
-            </a:extLst>
-          </p:cNvPr>
-          <p:cNvSpPr>
-            <a:spLocks noGrp="1"/>
-          </p:cNvSpPr>
-          <p:nvPr>
-            <p:ph type="body" sz="quarter" idx="29"/>
-          </p:nvPr>
-        </p:nvSpPr>
-        <p:spPr>
-          <a:xfrm>
-            <a:off x="2488785" y="5006270"/>
-            <a:ext cx="3995035" cy="426685"/>
-          </a:xfrm>
-        </p:spPr>
-        <p:txBody>
-          <a:bodyPr lIns="0" rIns="0" anchor="t">
-            <a:noAutofit/>
-          </a:bodyPr>
-          <a:lstStyle>
-            <a:lvl1pPr marL="0" indent="0">
-              <a:lnSpc>
-                <a:spcPct val="100000"/>
-              </a:lnSpc>
-              <a:buNone/>
-              <a:defRPr sz="1400">
-                <a:solidFill>
-                  <a:schemeClr val="tx1"/>
-                </a:solidFill>
-                <a:latin typeface="+mj-lt"/>
-              </a:defRPr>
-            </a:lvl1pPr>
-            <a:lvl2pPr marL="457200" indent="0">
-              <a:lnSpc>
-                <a:spcPct val="100000"/>
-              </a:lnSpc>
-              <a:buNone/>
-              <a:defRPr sz="900">
-                <a:solidFill>
-                  <a:schemeClr val="tx1"/>
-                </a:solidFill>
-                <a:latin typeface="Speak Pro" panose="020B0504020101020102" pitchFamily="34" charset="0"/>
-              </a:defRPr>
-            </a:lvl2pPr>
-            <a:lvl3pPr marL="914400" indent="0">
-              <a:lnSpc>
-                <a:spcPct val="100000"/>
-              </a:lnSpc>
-              <a:buNone/>
-              <a:defRPr sz="900">
-                <a:solidFill>
-                  <a:schemeClr val="tx1"/>
-                </a:solidFill>
-                <a:latin typeface="Speak Pro" panose="020B0504020101020102" pitchFamily="34" charset="0"/>
-              </a:defRPr>
-            </a:lvl3pPr>
-            <a:lvl4pPr marL="1371600" indent="0">
-              <a:lnSpc>
-                <a:spcPct val="100000"/>
-              </a:lnSpc>
-              <a:buNone/>
-              <a:defRPr sz="900">
-                <a:solidFill>
-                  <a:schemeClr val="tx1"/>
-                </a:solidFill>
-                <a:latin typeface="Speak Pro" panose="020B0504020101020102" pitchFamily="34" charset="0"/>
-              </a:defRPr>
-            </a:lvl4pPr>
-            <a:lvl5pPr marL="1828800" indent="0">
-              <a:lnSpc>
-                <a:spcPct val="100000"/>
-              </a:lnSpc>
-              <a:buNone/>
-              <a:defRPr sz="900">
-                <a:solidFill>
-                  <a:schemeClr val="tx1"/>
-                </a:solidFill>
-                <a:latin typeface="Speak Pro" panose="020B0504020101020102" pitchFamily="34" charset="0"/>
-              </a:defRPr>
-            </a:lvl5pPr>
-          </a:lstStyle>
-          <a:p>
-            <a:pPr lvl="0"/>
-            <a:r>
-              <a:rPr lang="en-US" noProof="0"/>
-              <a:t>Click to edit Master text styles</a:t>
-            </a:r>
-          </a:p>
-        </p:txBody>
-      </p:sp>
-      <p:sp>
-        <p:nvSpPr>
-          <p:cNvPr id="113" name="Text Placeholder 2">
-            <a:extLst>
-              <a:ext uri="{FF2B5EF4-FFF2-40B4-BE49-F238E27FC236}">
-                <a16:creationId xmlns:a16="http://schemas.microsoft.com/office/drawing/2014/main" id="{3F704107-F38D-E044-8226-ACDDEDEDC605}"/>
-              </a:ext>
-            </a:extLst>
-          </p:cNvPr>
-          <p:cNvSpPr>
-            <a:spLocks noGrp="1"/>
-          </p:cNvSpPr>
-          <p:nvPr>
-            <p:ph type="body" idx="30"/>
-          </p:nvPr>
-        </p:nvSpPr>
-        <p:spPr>
-          <a:xfrm>
-            <a:off x="2488784" y="4759411"/>
-            <a:ext cx="3995036" cy="365095"/>
-          </a:xfrm>
-        </p:spPr>
-        <p:txBody>
-          <a:bodyPr lIns="0" anchor="b">
-            <a:noAutofit/>
-          </a:bodyPr>
-          <a:lstStyle>
-            <a:lvl1pPr marL="0" indent="0">
-              <a:buNone/>
-              <a:defRPr sz="1800" b="1" cap="all" baseline="0">
-                <a:latin typeface="Speak Pro" panose="020B0504020101020102" pitchFamily="34" charset="0"/>
-              </a:defRPr>
-            </a:lvl1pPr>
-            <a:lvl2pPr marL="457200" indent="0">
-              <a:buNone/>
-              <a:defRPr sz="2000" b="1"/>
-            </a:lvl2pPr>
-            <a:lvl3pPr marL="914400" indent="0">
-              <a:buNone/>
-              <a:defRPr sz="1800" b="1"/>
-            </a:lvl3pPr>
-            <a:lvl4pPr marL="1371600" indent="0">
-              <a:buNone/>
-              <a:defRPr sz="1600" b="1"/>
-            </a:lvl4pPr>
-            <a:lvl5pPr marL="1828800" indent="0">
-              <a:buNone/>
-              <a:defRPr sz="1600" b="1"/>
-            </a:lvl5pPr>
-            <a:lvl6pPr marL="2286000" indent="0">
-              <a:buNone/>
-              <a:defRPr sz="1600" b="1"/>
-            </a:lvl6pPr>
-            <a:lvl7pPr marL="2743200" indent="0">
-              <a:buNone/>
-              <a:defRPr sz="1600" b="1"/>
-            </a:lvl7pPr>
-            <a:lvl8pPr marL="3200400" indent="0">
-              <a:buNone/>
-              <a:defRPr sz="1600" b="1"/>
-            </a:lvl8pPr>
-            <a:lvl9pPr marL="3657600" indent="0">
-              <a:buNone/>
-              <a:defRPr sz="1600" b="1"/>
-            </a:lvl9pPr>
-          </a:lstStyle>
-          <a:p>
-            <a:pPr lvl="0"/>
-            <a:r>
-              <a:rPr lang="en-US" noProof="0"/>
-              <a:t>Click to edit Master text styles</a:t>
-            </a:r>
-          </a:p>
-        </p:txBody>
-      </p:sp>
-      <p:sp>
-        <p:nvSpPr>
-          <p:cNvPr id="124" name="Text Placeholder 10">
-            <a:extLst>
-              <a:ext uri="{FF2B5EF4-FFF2-40B4-BE49-F238E27FC236}">
-                <a16:creationId xmlns:a16="http://schemas.microsoft.com/office/drawing/2014/main" id="{7A332327-16D9-9B48-8EAC-A4F377D5904D}"/>
-              </a:ext>
-            </a:extLst>
-          </p:cNvPr>
-          <p:cNvSpPr>
-            <a:spLocks noGrp="1"/>
-          </p:cNvSpPr>
-          <p:nvPr>
-            <p:ph type="body" sz="quarter" idx="33"/>
-          </p:nvPr>
-        </p:nvSpPr>
-        <p:spPr>
-          <a:xfrm>
-            <a:off x="7766655" y="2512451"/>
-            <a:ext cx="3995035" cy="426685"/>
-          </a:xfrm>
-        </p:spPr>
-        <p:txBody>
-          <a:bodyPr lIns="0" rIns="0" anchor="t">
-            <a:noAutofit/>
-          </a:bodyPr>
-          <a:lstStyle>
-            <a:lvl1pPr marL="0" indent="0">
-              <a:lnSpc>
-                <a:spcPct val="100000"/>
-              </a:lnSpc>
-              <a:buNone/>
-              <a:defRPr sz="1400">
-                <a:solidFill>
-                  <a:schemeClr val="tx1"/>
-                </a:solidFill>
-                <a:latin typeface="+mj-lt"/>
-              </a:defRPr>
-            </a:lvl1pPr>
-            <a:lvl2pPr marL="457200" indent="0">
-              <a:lnSpc>
-                <a:spcPct val="100000"/>
-              </a:lnSpc>
-              <a:buNone/>
-              <a:defRPr sz="900">
-                <a:solidFill>
-                  <a:schemeClr val="tx1"/>
-                </a:solidFill>
-                <a:latin typeface="Speak Pro" panose="020B0504020101020102" pitchFamily="34" charset="0"/>
-              </a:defRPr>
-            </a:lvl2pPr>
-            <a:lvl3pPr marL="914400" indent="0">
-              <a:lnSpc>
-                <a:spcPct val="100000"/>
-              </a:lnSpc>
-              <a:buNone/>
-              <a:defRPr sz="900">
-                <a:solidFill>
-                  <a:schemeClr val="tx1"/>
-                </a:solidFill>
-                <a:latin typeface="Speak Pro" panose="020B0504020101020102" pitchFamily="34" charset="0"/>
-              </a:defRPr>
-            </a:lvl3pPr>
-            <a:lvl4pPr marL="1371600" indent="0">
-              <a:lnSpc>
-                <a:spcPct val="100000"/>
-              </a:lnSpc>
-              <a:buNone/>
-              <a:defRPr sz="900">
-                <a:solidFill>
-                  <a:schemeClr val="tx1"/>
-                </a:solidFill>
-                <a:latin typeface="Speak Pro" panose="020B0504020101020102" pitchFamily="34" charset="0"/>
-              </a:defRPr>
-            </a:lvl4pPr>
-            <a:lvl5pPr marL="1828800" indent="0">
-              <a:lnSpc>
-                <a:spcPct val="100000"/>
-              </a:lnSpc>
-              <a:buNone/>
-              <a:defRPr sz="900">
-                <a:solidFill>
-                  <a:schemeClr val="tx1"/>
-                </a:solidFill>
-                <a:latin typeface="Speak Pro" panose="020B0504020101020102" pitchFamily="34" charset="0"/>
-              </a:defRPr>
-            </a:lvl5pPr>
-          </a:lstStyle>
-          <a:p>
-            <a:pPr lvl="0"/>
-            <a:r>
-              <a:rPr lang="en-US" noProof="0"/>
-              <a:t>Click to edit Master text styles</a:t>
-            </a:r>
-          </a:p>
-        </p:txBody>
-      </p:sp>
-      <p:sp>
-        <p:nvSpPr>
-          <p:cNvPr id="125" name="Text Placeholder 2">
-            <a:extLst>
-              <a:ext uri="{FF2B5EF4-FFF2-40B4-BE49-F238E27FC236}">
-                <a16:creationId xmlns:a16="http://schemas.microsoft.com/office/drawing/2014/main" id="{8EB0263B-D418-C14A-A00B-092B5EB5C515}"/>
-              </a:ext>
-            </a:extLst>
-          </p:cNvPr>
-          <p:cNvSpPr>
-            <a:spLocks noGrp="1"/>
-          </p:cNvSpPr>
-          <p:nvPr>
-            <p:ph type="body" idx="34"/>
-          </p:nvPr>
-        </p:nvSpPr>
-        <p:spPr>
-          <a:xfrm>
-            <a:off x="7766655" y="2265592"/>
-            <a:ext cx="3995036" cy="365095"/>
-          </a:xfrm>
-        </p:spPr>
-        <p:txBody>
-          <a:bodyPr lIns="0" anchor="b">
-            <a:noAutofit/>
-          </a:bodyPr>
-          <a:lstStyle>
-            <a:lvl1pPr marL="0" indent="0">
-              <a:buNone/>
-              <a:defRPr sz="1800" b="1" cap="all" baseline="0">
-                <a:latin typeface="Speak Pro" panose="020B0504020101020102" pitchFamily="34" charset="0"/>
-              </a:defRPr>
-            </a:lvl1pPr>
-            <a:lvl2pPr marL="457200" indent="0">
-              <a:buNone/>
-              <a:defRPr sz="2000" b="1"/>
-            </a:lvl2pPr>
-            <a:lvl3pPr marL="914400" indent="0">
-              <a:buNone/>
-              <a:defRPr sz="1800" b="1"/>
-            </a:lvl3pPr>
-            <a:lvl4pPr marL="1371600" indent="0">
-              <a:buNone/>
-              <a:defRPr sz="1600" b="1"/>
-            </a:lvl4pPr>
-            <a:lvl5pPr marL="1828800" indent="0">
-              <a:buNone/>
-              <a:defRPr sz="1600" b="1"/>
-            </a:lvl5pPr>
-            <a:lvl6pPr marL="2286000" indent="0">
-              <a:buNone/>
-              <a:defRPr sz="1600" b="1"/>
-            </a:lvl6pPr>
-            <a:lvl7pPr marL="2743200" indent="0">
-              <a:buNone/>
-              <a:defRPr sz="1600" b="1"/>
-            </a:lvl7pPr>
-            <a:lvl8pPr marL="3200400" indent="0">
-              <a:buNone/>
-              <a:defRPr sz="1600" b="1"/>
-            </a:lvl8pPr>
-            <a:lvl9pPr marL="3657600" indent="0">
-              <a:buNone/>
-              <a:defRPr sz="1600" b="1"/>
-            </a:lvl9pPr>
-          </a:lstStyle>
-          <a:p>
-            <a:pPr lvl="0"/>
-            <a:r>
-              <a:rPr lang="en-US" noProof="0"/>
-              <a:t>Click to edit Master text styles</a:t>
-            </a:r>
-          </a:p>
-        </p:txBody>
-      </p:sp>
-      <p:sp>
-        <p:nvSpPr>
-          <p:cNvPr id="126" name="Text Placeholder 10">
-            <a:extLst>
-              <a:ext uri="{FF2B5EF4-FFF2-40B4-BE49-F238E27FC236}">
-                <a16:creationId xmlns:a16="http://schemas.microsoft.com/office/drawing/2014/main" id="{53CC49A6-2AB5-664B-9A6C-56D70E1382D7}"/>
-              </a:ext>
-            </a:extLst>
-          </p:cNvPr>
-          <p:cNvSpPr>
-            <a:spLocks noGrp="1"/>
-          </p:cNvSpPr>
-          <p:nvPr>
-            <p:ph type="body" sz="quarter" idx="35"/>
-          </p:nvPr>
-        </p:nvSpPr>
-        <p:spPr>
-          <a:xfrm>
-            <a:off x="7766655" y="3745506"/>
-            <a:ext cx="3995035" cy="426685"/>
-          </a:xfrm>
-        </p:spPr>
-        <p:txBody>
-          <a:bodyPr lIns="0" rIns="0" anchor="t">
-            <a:noAutofit/>
-          </a:bodyPr>
-          <a:lstStyle>
-            <a:lvl1pPr marL="0" indent="0">
-              <a:lnSpc>
-                <a:spcPct val="100000"/>
-              </a:lnSpc>
-              <a:buNone/>
-              <a:defRPr sz="1400">
-                <a:solidFill>
-                  <a:schemeClr val="tx1"/>
-                </a:solidFill>
-                <a:latin typeface="+mj-lt"/>
-              </a:defRPr>
-            </a:lvl1pPr>
-            <a:lvl2pPr marL="457200" indent="0">
-              <a:lnSpc>
-                <a:spcPct val="100000"/>
-              </a:lnSpc>
-              <a:buNone/>
-              <a:defRPr sz="900">
-                <a:solidFill>
-                  <a:schemeClr val="tx1"/>
-                </a:solidFill>
-                <a:latin typeface="Speak Pro" panose="020B0504020101020102" pitchFamily="34" charset="0"/>
-              </a:defRPr>
-            </a:lvl2pPr>
-            <a:lvl3pPr marL="914400" indent="0">
-              <a:lnSpc>
-                <a:spcPct val="100000"/>
-              </a:lnSpc>
-              <a:buNone/>
-              <a:defRPr sz="900">
-                <a:solidFill>
-                  <a:schemeClr val="tx1"/>
-                </a:solidFill>
-                <a:latin typeface="Speak Pro" panose="020B0504020101020102" pitchFamily="34" charset="0"/>
-              </a:defRPr>
-            </a:lvl3pPr>
-            <a:lvl4pPr marL="1371600" indent="0">
-              <a:lnSpc>
-                <a:spcPct val="100000"/>
-              </a:lnSpc>
-              <a:buNone/>
-              <a:defRPr sz="900">
-                <a:solidFill>
-                  <a:schemeClr val="tx1"/>
-                </a:solidFill>
-                <a:latin typeface="Speak Pro" panose="020B0504020101020102" pitchFamily="34" charset="0"/>
-              </a:defRPr>
-            </a:lvl4pPr>
-            <a:lvl5pPr marL="1828800" indent="0">
-              <a:lnSpc>
-                <a:spcPct val="100000"/>
-              </a:lnSpc>
-              <a:buNone/>
-              <a:defRPr sz="900">
-                <a:solidFill>
-                  <a:schemeClr val="tx1"/>
-                </a:solidFill>
-                <a:latin typeface="Speak Pro" panose="020B0504020101020102" pitchFamily="34" charset="0"/>
-              </a:defRPr>
-            </a:lvl5pPr>
-          </a:lstStyle>
-          <a:p>
-            <a:pPr lvl="0"/>
-            <a:r>
-              <a:rPr lang="en-US" noProof="0"/>
-              <a:t>Click to edit Master text styles</a:t>
-            </a:r>
-          </a:p>
-        </p:txBody>
-      </p:sp>
-      <p:sp>
-        <p:nvSpPr>
-          <p:cNvPr id="127" name="Text Placeholder 2">
-            <a:extLst>
-              <a:ext uri="{FF2B5EF4-FFF2-40B4-BE49-F238E27FC236}">
-                <a16:creationId xmlns:a16="http://schemas.microsoft.com/office/drawing/2014/main" id="{718CCABC-AF06-5241-8D13-EB2F4637D435}"/>
-              </a:ext>
-            </a:extLst>
-          </p:cNvPr>
-          <p:cNvSpPr>
-            <a:spLocks noGrp="1"/>
-          </p:cNvSpPr>
-          <p:nvPr>
-            <p:ph type="body" idx="36"/>
-          </p:nvPr>
-        </p:nvSpPr>
-        <p:spPr>
-          <a:xfrm>
-            <a:off x="7766655" y="3498647"/>
-            <a:ext cx="3995036" cy="365095"/>
-          </a:xfrm>
-        </p:spPr>
-        <p:txBody>
-          <a:bodyPr lIns="0" anchor="b">
-            <a:noAutofit/>
-          </a:bodyPr>
-          <a:lstStyle>
-            <a:lvl1pPr marL="0" indent="0">
-              <a:buNone/>
-              <a:defRPr sz="1800" b="1" cap="all" baseline="0">
-                <a:latin typeface="Speak Pro" panose="020B0504020101020102" pitchFamily="34" charset="0"/>
-              </a:defRPr>
-            </a:lvl1pPr>
-            <a:lvl2pPr marL="457200" indent="0">
-              <a:buNone/>
-              <a:defRPr sz="2000" b="1"/>
-            </a:lvl2pPr>
-            <a:lvl3pPr marL="914400" indent="0">
-              <a:buNone/>
-              <a:defRPr sz="1800" b="1"/>
-            </a:lvl3pPr>
-            <a:lvl4pPr marL="1371600" indent="0">
-              <a:buNone/>
-              <a:defRPr sz="1600" b="1"/>
-            </a:lvl4pPr>
-            <a:lvl5pPr marL="1828800" indent="0">
-              <a:buNone/>
-              <a:defRPr sz="1600" b="1"/>
-            </a:lvl5pPr>
-            <a:lvl6pPr marL="2286000" indent="0">
-              <a:buNone/>
-              <a:defRPr sz="1600" b="1"/>
-            </a:lvl6pPr>
-            <a:lvl7pPr marL="2743200" indent="0">
-              <a:buNone/>
-              <a:defRPr sz="1600" b="1"/>
-            </a:lvl7pPr>
-            <a:lvl8pPr marL="3200400" indent="0">
-              <a:buNone/>
-              <a:defRPr sz="1600" b="1"/>
-            </a:lvl8pPr>
-            <a:lvl9pPr marL="3657600" indent="0">
-              <a:buNone/>
-              <a:defRPr sz="1600" b="1"/>
-            </a:lvl9pPr>
-          </a:lstStyle>
-          <a:p>
-            <a:pPr lvl="0"/>
-            <a:r>
-              <a:rPr lang="en-US" noProof="0"/>
-              <a:t>Click to edit Master text styles</a:t>
-            </a:r>
-          </a:p>
-        </p:txBody>
-      </p:sp>
-      <p:sp>
-        <p:nvSpPr>
-          <p:cNvPr id="128" name="Text Placeholder 10">
-            <a:extLst>
-              <a:ext uri="{FF2B5EF4-FFF2-40B4-BE49-F238E27FC236}">
-                <a16:creationId xmlns:a16="http://schemas.microsoft.com/office/drawing/2014/main" id="{5119242C-1FE8-C140-9349-8172F954E3CB}"/>
-              </a:ext>
-            </a:extLst>
-          </p:cNvPr>
-          <p:cNvSpPr>
-            <a:spLocks noGrp="1"/>
-          </p:cNvSpPr>
-          <p:nvPr>
-            <p:ph type="body" sz="quarter" idx="37"/>
-          </p:nvPr>
-        </p:nvSpPr>
-        <p:spPr>
-          <a:xfrm>
-            <a:off x="7766655" y="5006270"/>
-            <a:ext cx="3995035" cy="426685"/>
-          </a:xfrm>
-        </p:spPr>
-        <p:txBody>
-          <a:bodyPr lIns="0" rIns="0" anchor="t">
-            <a:noAutofit/>
-          </a:bodyPr>
-          <a:lstStyle>
-            <a:lvl1pPr marL="0" indent="0">
-              <a:lnSpc>
-                <a:spcPct val="100000"/>
-              </a:lnSpc>
-              <a:buNone/>
-              <a:defRPr sz="1400">
-                <a:solidFill>
-                  <a:schemeClr val="tx1"/>
-                </a:solidFill>
-                <a:latin typeface="+mj-lt"/>
-              </a:defRPr>
-            </a:lvl1pPr>
-            <a:lvl2pPr marL="457200" indent="0">
-              <a:lnSpc>
-                <a:spcPct val="100000"/>
-              </a:lnSpc>
-              <a:buNone/>
-              <a:defRPr sz="900">
-                <a:solidFill>
-                  <a:schemeClr val="tx1"/>
-                </a:solidFill>
-                <a:latin typeface="Speak Pro" panose="020B0504020101020102" pitchFamily="34" charset="0"/>
-              </a:defRPr>
-            </a:lvl2pPr>
-            <a:lvl3pPr marL="914400" indent="0">
-              <a:lnSpc>
-                <a:spcPct val="100000"/>
-              </a:lnSpc>
-              <a:buNone/>
-              <a:defRPr sz="900">
-                <a:solidFill>
-                  <a:schemeClr val="tx1"/>
-                </a:solidFill>
-                <a:latin typeface="Speak Pro" panose="020B0504020101020102" pitchFamily="34" charset="0"/>
-              </a:defRPr>
-            </a:lvl3pPr>
-            <a:lvl4pPr marL="1371600" indent="0">
-              <a:lnSpc>
-                <a:spcPct val="100000"/>
-              </a:lnSpc>
-              <a:buNone/>
-              <a:defRPr sz="900">
-                <a:solidFill>
-                  <a:schemeClr val="tx1"/>
-                </a:solidFill>
-                <a:latin typeface="Speak Pro" panose="020B0504020101020102" pitchFamily="34" charset="0"/>
-              </a:defRPr>
-            </a:lvl4pPr>
-            <a:lvl5pPr marL="1828800" indent="0">
-              <a:lnSpc>
-                <a:spcPct val="100000"/>
-              </a:lnSpc>
-              <a:buNone/>
-              <a:defRPr sz="900">
-                <a:solidFill>
-                  <a:schemeClr val="tx1"/>
-                </a:solidFill>
-                <a:latin typeface="Speak Pro" panose="020B0504020101020102" pitchFamily="34" charset="0"/>
-              </a:defRPr>
-            </a:lvl5pPr>
-          </a:lstStyle>
-          <a:p>
-            <a:pPr lvl="0"/>
-            <a:r>
-              <a:rPr lang="en-US" noProof="0"/>
-              <a:t>Click to edit Master text styles</a:t>
-            </a:r>
-          </a:p>
-        </p:txBody>
-      </p:sp>
-      <p:sp>
-        <p:nvSpPr>
-          <p:cNvPr id="129" name="Text Placeholder 2">
-            <a:extLst>
-              <a:ext uri="{FF2B5EF4-FFF2-40B4-BE49-F238E27FC236}">
-                <a16:creationId xmlns:a16="http://schemas.microsoft.com/office/drawing/2014/main" id="{23F2AE0B-3E70-BB47-8FBC-FE66A5A297BD}"/>
-              </a:ext>
-            </a:extLst>
-          </p:cNvPr>
-          <p:cNvSpPr>
-            <a:spLocks noGrp="1"/>
-          </p:cNvSpPr>
-          <p:nvPr>
-            <p:ph type="body" idx="38"/>
-          </p:nvPr>
-        </p:nvSpPr>
-        <p:spPr>
-          <a:xfrm>
-            <a:off x="7766655" y="4759411"/>
-            <a:ext cx="3995036" cy="365095"/>
-          </a:xfrm>
-        </p:spPr>
-        <p:txBody>
-          <a:bodyPr lIns="0" anchor="b">
-            <a:noAutofit/>
-          </a:bodyPr>
-          <a:lstStyle>
-            <a:lvl1pPr marL="0" indent="0">
-              <a:buNone/>
-              <a:defRPr sz="1800" b="1" cap="all" baseline="0">
-                <a:latin typeface="Speak Pro" panose="020B0504020101020102" pitchFamily="34" charset="0"/>
-              </a:defRPr>
-            </a:lvl1pPr>
-            <a:lvl2pPr marL="457200" indent="0">
-              <a:buNone/>
-              <a:defRPr sz="2000" b="1"/>
-            </a:lvl2pPr>
-            <a:lvl3pPr marL="914400" indent="0">
-              <a:buNone/>
-              <a:defRPr sz="1800" b="1"/>
-            </a:lvl3pPr>
-            <a:lvl4pPr marL="1371600" indent="0">
-              <a:buNone/>
-              <a:defRPr sz="1600" b="1"/>
-            </a:lvl4pPr>
-            <a:lvl5pPr marL="1828800" indent="0">
-              <a:buNone/>
-              <a:defRPr sz="1600" b="1"/>
-            </a:lvl5pPr>
-            <a:lvl6pPr marL="2286000" indent="0">
-              <a:buNone/>
-              <a:defRPr sz="1600" b="1"/>
-            </a:lvl6pPr>
-            <a:lvl7pPr marL="2743200" indent="0">
-              <a:buNone/>
-              <a:defRPr sz="1600" b="1"/>
-            </a:lvl7pPr>
-            <a:lvl8pPr marL="3200400" indent="0">
-              <a:buNone/>
-              <a:defRPr sz="1600" b="1"/>
-            </a:lvl8pPr>
-            <a:lvl9pPr marL="3657600" indent="0">
-              <a:buNone/>
-              <a:defRPr sz="1600" b="1"/>
-            </a:lvl9pPr>
-          </a:lstStyle>
-          <a:p>
-            <a:pPr lvl="0"/>
-            <a:r>
-              <a:rPr lang="en-US" noProof="0"/>
-              <a:t>Click to edit Master text styles</a:t>
-            </a:r>
-          </a:p>
-        </p:txBody>
-      </p:sp>
-      <p:cxnSp>
-        <p:nvCxnSpPr>
-          <p:cNvPr id="41" name="Straight Connector 40">
-            <a:extLst>
-              <a:ext uri="{FF2B5EF4-FFF2-40B4-BE49-F238E27FC236}">
-                <a16:creationId xmlns:a16="http://schemas.microsoft.com/office/drawing/2014/main" id="{2D604C81-B013-4641-9B16-5E9ECBD30CBA}"/>
-              </a:ext>
-            </a:extLst>
-          </p:cNvPr>
-          <p:cNvCxnSpPr>
-            <a:cxnSpLocks/>
-          </p:cNvCxnSpPr>
-          <p:nvPr userDrawn="1"/>
-        </p:nvCxnSpPr>
-        <p:spPr>
-          <a:xfrm>
-            <a:off x="1134319" y="0"/>
-            <a:ext cx="0" cy="6858000"/>
-          </a:xfrm>
-          <a:prstGeom prst="line">
-            <a:avLst/>
-          </a:prstGeom>
-          <a:ln w="12700">
-            <a:solidFill>
-              <a:schemeClr val="tx1"/>
-            </a:solidFill>
-          </a:ln>
-        </p:spPr>
-        <p:style>
-          <a:lnRef idx="1">
-            <a:schemeClr val="accent1"/>
-          </a:lnRef>
-          <a:fillRef idx="0">
-            <a:schemeClr val="accent1"/>
-          </a:fillRef>
-          <a:effectRef idx="0">
-            <a:schemeClr val="accent1"/>
-          </a:effectRef>
-          <a:fontRef idx="minor">
-            <a:schemeClr val="tx1"/>
-          </a:fontRef>
-        </p:style>
-      </p:cxnSp>
-    </p:spTree>
-    <p:extLst>
-      <p:ext uri="{BB962C8B-B14F-4D97-AF65-F5344CB8AC3E}">
-        <p14:creationId xmlns:p14="http://schemas.microsoft.com/office/powerpoint/2010/main" val="2734089126"/>
-      </p:ext>
-    </p:extLst>
-  </p:cSld>
-  <p:clrMapOvr>
-    <a:masterClrMapping/>
-  </p:clrMapOvr>
-</p:sldLayout>
-</file>
-
-<file path=ppt/slideLayouts/slideLayout36.xml><?xml version="1.0" encoding="utf-8"?>
 <p:sldLayout xmlns:a="http://schemas.openxmlformats.org/drawingml/2006/main" xmlns:r="http://schemas.openxmlformats.org/officeDocument/2006/relationships" xmlns:p="http://schemas.openxmlformats.org/presentationml/2006/main" preserve="1" userDrawn="1">
   <p:cSld name="Overview_2">
     <p:spTree>
@@ -14495,7 +13218,7 @@
           <a:p>
             <a:fld id="{8F9F391E-143D-F948-ADAE-29AEA3C1EBFB}" type="datetimeFigureOut">
               <a:rPr lang="en-US" smtClean="0"/>
-              <a:t>6/25/2020</a:t>
+              <a:t>6/26/2020</a:t>
             </a:fld>
             <a:endParaRPr lang="en-US" dirty="0"/>
           </a:p>
@@ -16305,7 +15028,7 @@
 </p:sldLayout>
 </file>
 
-<file path=ppt/slideLayouts/slideLayout37.xml><?xml version="1.0" encoding="utf-8"?>
+<file path=ppt/slideLayouts/slideLayout36.xml><?xml version="1.0" encoding="utf-8"?>
 <p:sldLayout xmlns:a="http://schemas.openxmlformats.org/drawingml/2006/main" xmlns:r="http://schemas.openxmlformats.org/officeDocument/2006/relationships" xmlns:p="http://schemas.openxmlformats.org/presentationml/2006/main" preserve="1" userDrawn="1">
   <p:cSld name="Overview_3">
     <p:spTree>
@@ -16350,7 +15073,7 @@
           <a:p>
             <a:fld id="{8F9F391E-143D-F948-ADAE-29AEA3C1EBFB}" type="datetimeFigureOut">
               <a:rPr lang="en-US" smtClean="0"/>
-              <a:t>6/25/2020</a:t>
+              <a:t>6/26/2020</a:t>
             </a:fld>
             <a:endParaRPr lang="en-US" dirty="0"/>
           </a:p>
@@ -18163,7 +16886,7 @@
 </p:sldLayout>
 </file>
 
-<file path=ppt/slideLayouts/slideLayout38.xml><?xml version="1.0" encoding="utf-8"?>
+<file path=ppt/slideLayouts/slideLayout37.xml><?xml version="1.0" encoding="utf-8"?>
 <p:sldLayout xmlns:a="http://schemas.openxmlformats.org/drawingml/2006/main" xmlns:r="http://schemas.openxmlformats.org/officeDocument/2006/relationships" xmlns:p="http://schemas.openxmlformats.org/presentationml/2006/main" preserve="1" userDrawn="1">
   <p:cSld name="Overview_4">
     <p:spTree>
@@ -18311,7 +17034,7 @@
             <a:fld id="{8F9F391E-143D-F948-ADAE-29AEA3C1EBFB}" type="datetimeFigureOut">
               <a:rPr lang="en-US" smtClean="0"/>
               <a:pPr/>
-              <a:t>6/25/2020</a:t>
+              <a:t>6/26/2020</a:t>
             </a:fld>
             <a:endParaRPr lang="en-US" dirty="0"/>
           </a:p>
@@ -19848,7 +18571,7 @@
 </p:sldLayout>
 </file>
 
-<file path=ppt/slideLayouts/slideLayout39.xml><?xml version="1.0" encoding="utf-8"?>
+<file path=ppt/slideLayouts/slideLayout38.xml><?xml version="1.0" encoding="utf-8"?>
 <p:sldLayout xmlns:a="http://schemas.openxmlformats.org/drawingml/2006/main" xmlns:r="http://schemas.openxmlformats.org/officeDocument/2006/relationships" xmlns:p="http://schemas.openxmlformats.org/presentationml/2006/main" preserve="1" userDrawn="1">
   <p:cSld name="Overview_5">
     <p:spTree>
@@ -19996,7 +18719,7 @@
             <a:fld id="{8F9F391E-143D-F948-ADAE-29AEA3C1EBFB}" type="datetimeFigureOut">
               <a:rPr lang="en-US" smtClean="0"/>
               <a:pPr/>
-              <a:t>6/25/2020</a:t>
+              <a:t>6/26/2020</a:t>
             </a:fld>
             <a:endParaRPr lang="en-US" dirty="0"/>
           </a:p>
@@ -21967,7 +20690,7 @@
           <a:p>
             <a:fld id="{8F9F391E-143D-F948-ADAE-29AEA3C1EBFB}" type="datetimeFigureOut">
               <a:rPr lang="en-US" smtClean="0"/>
-              <a:t>6/25/2020</a:t>
+              <a:t>6/26/2020</a:t>
             </a:fld>
             <a:endParaRPr lang="en-US" dirty="0"/>
           </a:p>
@@ -22326,7 +21049,7 @@
           <a:p>
             <a:fld id="{8F9F391E-143D-F948-ADAE-29AEA3C1EBFB}" type="datetimeFigureOut">
               <a:rPr lang="en-US" smtClean="0"/>
-              <a:t>6/25/2020</a:t>
+              <a:t>6/26/2020</a:t>
             </a:fld>
             <a:endParaRPr lang="en-US" dirty="0"/>
           </a:p>
@@ -22685,7 +21408,7 @@
           <a:p>
             <a:fld id="{8F9F391E-143D-F948-ADAE-29AEA3C1EBFB}" type="datetimeFigureOut">
               <a:rPr lang="en-US" smtClean="0"/>
-              <a:t>6/25/2020</a:t>
+              <a:t>6/26/2020</a:t>
             </a:fld>
             <a:endParaRPr lang="en-US" dirty="0"/>
           </a:p>
@@ -23133,7 +21856,7 @@
           <a:p>
             <a:fld id="{8F9F391E-143D-F948-ADAE-29AEA3C1EBFB}" type="datetimeFigureOut">
               <a:rPr lang="en-US" smtClean="0"/>
-              <a:t>6/25/2020</a:t>
+              <a:t>6/26/2020</a:t>
             </a:fld>
             <a:endParaRPr lang="en-US" dirty="0"/>
           </a:p>
@@ -23591,7 +22314,7 @@
           <a:p>
             <a:fld id="{8F9F391E-143D-F948-ADAE-29AEA3C1EBFB}" type="datetimeFigureOut">
               <a:rPr lang="en-US" smtClean="0"/>
-              <a:t>6/25/2020</a:t>
+              <a:t>6/26/2020</a:t>
             </a:fld>
             <a:endParaRPr lang="en-US" dirty="0"/>
           </a:p>
@@ -24091,7 +22814,7 @@
           <a:p>
             <a:fld id="{F5356824-A55C-4F44-B9CB-109B027241D7}" type="datetimeFigureOut">
               <a:rPr lang="en-US" smtClean="0"/>
-              <a:t>6/25/2020</a:t>
+              <a:t>6/26/2020</a:t>
             </a:fld>
             <a:endParaRPr lang="en-US" dirty="0"/>
           </a:p>
@@ -24230,11 +22953,10 @@
     <p:sldLayoutId id="2147483704" r:id="rId32"/>
     <p:sldLayoutId id="2147483705" r:id="rId33"/>
     <p:sldLayoutId id="2147483706" r:id="rId34"/>
-    <p:sldLayoutId id="2147483668" r:id="rId35"/>
-    <p:sldLayoutId id="2147483700" r:id="rId36"/>
-    <p:sldLayoutId id="2147483699" r:id="rId37"/>
-    <p:sldLayoutId id="2147483701" r:id="rId38"/>
-    <p:sldLayoutId id="2147483702" r:id="rId39"/>
+    <p:sldLayoutId id="2147483700" r:id="rId35"/>
+    <p:sldLayoutId id="2147483699" r:id="rId36"/>
+    <p:sldLayoutId id="2147483701" r:id="rId37"/>
+    <p:sldLayoutId id="2147483702" r:id="rId38"/>
   </p:sldLayoutIdLst>
   <p:txStyles>
     <p:titleStyle>
@@ -25365,418 +24087,6 @@
 </p:sld>
 </file>
 
-<file path=ppt/slides/slide15.xml><?xml version="1.0" encoding="utf-8"?>
-<p:sld xmlns:a="http://schemas.openxmlformats.org/drawingml/2006/main" xmlns:r="http://schemas.openxmlformats.org/officeDocument/2006/relationships" xmlns:p="http://schemas.openxmlformats.org/presentationml/2006/main">
-  <p:cSld>
-    <p:spTree>
-      <p:nvGrpSpPr>
-        <p:cNvPr id="1" name=""/>
-        <p:cNvGrpSpPr/>
-        <p:nvPr/>
-      </p:nvGrpSpPr>
-      <p:grpSpPr>
-        <a:xfrm>
-          <a:off x="0" y="0"/>
-          <a:ext cx="0" cy="0"/>
-          <a:chOff x="0" y="0"/>
-          <a:chExt cx="0" cy="0"/>
-        </a:xfrm>
-      </p:grpSpPr>
-      <p:sp>
-        <p:nvSpPr>
-          <p:cNvPr id="3" name="Title 2">
-            <a:extLst>
-              <a:ext uri="{FF2B5EF4-FFF2-40B4-BE49-F238E27FC236}">
-                <a16:creationId xmlns:a16="http://schemas.microsoft.com/office/drawing/2014/main" id="{12B178B4-CDED-454C-BED2-2E2B10ADA703}"/>
-              </a:ext>
-            </a:extLst>
-          </p:cNvPr>
-          <p:cNvSpPr>
-            <a:spLocks noGrp="1"/>
-          </p:cNvSpPr>
-          <p:nvPr>
-            <p:ph type="ctrTitle"/>
-          </p:nvPr>
-        </p:nvSpPr>
-        <p:spPr/>
-        <p:txBody>
-          <a:bodyPr/>
-          <a:lstStyle/>
-          <a:p>
-            <a:r>
-              <a:rPr lang="en-US" dirty="0"/>
-              <a:t>Summary</a:t>
-            </a:r>
-          </a:p>
-        </p:txBody>
-      </p:sp>
-      <p:sp>
-        <p:nvSpPr>
-          <p:cNvPr id="10" name="Picture Placeholder 9">
-            <a:extLst>
-              <a:ext uri="{FF2B5EF4-FFF2-40B4-BE49-F238E27FC236}">
-                <a16:creationId xmlns:a16="http://schemas.microsoft.com/office/drawing/2014/main" id="{5EBEC38D-8C81-4819-A68F-A85B2714C9CF}"/>
-              </a:ext>
-            </a:extLst>
-          </p:cNvPr>
-          <p:cNvSpPr>
-            <a:spLocks noGrp="1"/>
-          </p:cNvSpPr>
-          <p:nvPr>
-            <p:ph type="pic" sz="quarter" idx="21"/>
-          </p:nvPr>
-        </p:nvSpPr>
-        <p:spPr/>
-      </p:sp>
-      <p:sp>
-        <p:nvSpPr>
-          <p:cNvPr id="12" name="Picture Placeholder 11">
-            <a:extLst>
-              <a:ext uri="{FF2B5EF4-FFF2-40B4-BE49-F238E27FC236}">
-                <a16:creationId xmlns:a16="http://schemas.microsoft.com/office/drawing/2014/main" id="{EE65D19D-4062-4107-9D29-78F684B12ADC}"/>
-              </a:ext>
-            </a:extLst>
-          </p:cNvPr>
-          <p:cNvSpPr>
-            <a:spLocks noGrp="1"/>
-          </p:cNvSpPr>
-          <p:nvPr>
-            <p:ph type="pic" sz="quarter" idx="22"/>
-          </p:nvPr>
-        </p:nvSpPr>
-        <p:spPr/>
-      </p:sp>
-      <p:sp>
-        <p:nvSpPr>
-          <p:cNvPr id="14" name="Picture Placeholder 13">
-            <a:extLst>
-              <a:ext uri="{FF2B5EF4-FFF2-40B4-BE49-F238E27FC236}">
-                <a16:creationId xmlns:a16="http://schemas.microsoft.com/office/drawing/2014/main" id="{B4E63BD2-06C4-400E-98E0-C9927FDAE126}"/>
-              </a:ext>
-            </a:extLst>
-          </p:cNvPr>
-          <p:cNvSpPr>
-            <a:spLocks noGrp="1"/>
-          </p:cNvSpPr>
-          <p:nvPr>
-            <p:ph type="pic" sz="quarter" idx="23"/>
-          </p:nvPr>
-        </p:nvSpPr>
-        <p:spPr/>
-      </p:sp>
-      <p:sp>
-        <p:nvSpPr>
-          <p:cNvPr id="16" name="Text Placeholder 15">
-            <a:extLst>
-              <a:ext uri="{FF2B5EF4-FFF2-40B4-BE49-F238E27FC236}">
-                <a16:creationId xmlns:a16="http://schemas.microsoft.com/office/drawing/2014/main" id="{9DA4EE4E-A152-4615-91C4-06DD2C361F31}"/>
-              </a:ext>
-            </a:extLst>
-          </p:cNvPr>
-          <p:cNvSpPr>
-            <a:spLocks noGrp="1"/>
-          </p:cNvSpPr>
-          <p:nvPr>
-            <p:ph type="body" sz="quarter" idx="25"/>
-          </p:nvPr>
-        </p:nvSpPr>
-        <p:spPr/>
-        <p:txBody>
-          <a:bodyPr/>
-          <a:lstStyle/>
-          <a:p>
-            <a:endParaRPr lang="en-US" dirty="0"/>
-          </a:p>
-        </p:txBody>
-      </p:sp>
-      <p:sp>
-        <p:nvSpPr>
-          <p:cNvPr id="18" name="Text Placeholder 17">
-            <a:extLst>
-              <a:ext uri="{FF2B5EF4-FFF2-40B4-BE49-F238E27FC236}">
-                <a16:creationId xmlns:a16="http://schemas.microsoft.com/office/drawing/2014/main" id="{7A4C53AB-4FDF-4ED5-A51A-08369B928471}"/>
-              </a:ext>
-            </a:extLst>
-          </p:cNvPr>
-          <p:cNvSpPr>
-            <a:spLocks noGrp="1"/>
-          </p:cNvSpPr>
-          <p:nvPr>
-            <p:ph type="body" idx="26"/>
-          </p:nvPr>
-        </p:nvSpPr>
-        <p:spPr/>
-        <p:txBody>
-          <a:bodyPr/>
-          <a:lstStyle/>
-          <a:p>
-            <a:endParaRPr lang="en-US" dirty="0"/>
-          </a:p>
-        </p:txBody>
-      </p:sp>
-      <p:sp>
-        <p:nvSpPr>
-          <p:cNvPr id="20" name="Text Placeholder 19">
-            <a:extLst>
-              <a:ext uri="{FF2B5EF4-FFF2-40B4-BE49-F238E27FC236}">
-                <a16:creationId xmlns:a16="http://schemas.microsoft.com/office/drawing/2014/main" id="{3B5BFF9F-9A1E-42C8-95D5-9600F4357C6E}"/>
-              </a:ext>
-            </a:extLst>
-          </p:cNvPr>
-          <p:cNvSpPr>
-            <a:spLocks noGrp="1"/>
-          </p:cNvSpPr>
-          <p:nvPr>
-            <p:ph type="body" sz="quarter" idx="27"/>
-          </p:nvPr>
-        </p:nvSpPr>
-        <p:spPr/>
-        <p:txBody>
-          <a:bodyPr/>
-          <a:lstStyle/>
-          <a:p>
-            <a:endParaRPr lang="en-US" dirty="0"/>
-          </a:p>
-        </p:txBody>
-      </p:sp>
-      <p:sp>
-        <p:nvSpPr>
-          <p:cNvPr id="22" name="Text Placeholder 21">
-            <a:extLst>
-              <a:ext uri="{FF2B5EF4-FFF2-40B4-BE49-F238E27FC236}">
-                <a16:creationId xmlns:a16="http://schemas.microsoft.com/office/drawing/2014/main" id="{27F1548D-F6DB-44F2-8D2F-42703F9A5942}"/>
-              </a:ext>
-            </a:extLst>
-          </p:cNvPr>
-          <p:cNvSpPr>
-            <a:spLocks noGrp="1"/>
-          </p:cNvSpPr>
-          <p:nvPr>
-            <p:ph type="body" idx="28"/>
-          </p:nvPr>
-        </p:nvSpPr>
-        <p:spPr/>
-        <p:txBody>
-          <a:bodyPr/>
-          <a:lstStyle/>
-          <a:p>
-            <a:endParaRPr lang="en-US" dirty="0"/>
-          </a:p>
-        </p:txBody>
-      </p:sp>
-      <p:sp>
-        <p:nvSpPr>
-          <p:cNvPr id="24" name="Text Placeholder 23">
-            <a:extLst>
-              <a:ext uri="{FF2B5EF4-FFF2-40B4-BE49-F238E27FC236}">
-                <a16:creationId xmlns:a16="http://schemas.microsoft.com/office/drawing/2014/main" id="{5DFC0D37-454C-47AE-96DC-63BEE642C776}"/>
-              </a:ext>
-            </a:extLst>
-          </p:cNvPr>
-          <p:cNvSpPr>
-            <a:spLocks noGrp="1"/>
-          </p:cNvSpPr>
-          <p:nvPr>
-            <p:ph type="body" sz="quarter" idx="29"/>
-          </p:nvPr>
-        </p:nvSpPr>
-        <p:spPr/>
-        <p:txBody>
-          <a:bodyPr/>
-          <a:lstStyle/>
-          <a:p>
-            <a:endParaRPr lang="en-US" dirty="0"/>
-          </a:p>
-        </p:txBody>
-      </p:sp>
-      <p:sp>
-        <p:nvSpPr>
-          <p:cNvPr id="26" name="Text Placeholder 25">
-            <a:extLst>
-              <a:ext uri="{FF2B5EF4-FFF2-40B4-BE49-F238E27FC236}">
-                <a16:creationId xmlns:a16="http://schemas.microsoft.com/office/drawing/2014/main" id="{64EADE51-FE86-4D90-9259-C9ABE16C92B5}"/>
-              </a:ext>
-            </a:extLst>
-          </p:cNvPr>
-          <p:cNvSpPr>
-            <a:spLocks noGrp="1"/>
-          </p:cNvSpPr>
-          <p:nvPr>
-            <p:ph type="body" idx="30"/>
-          </p:nvPr>
-        </p:nvSpPr>
-        <p:spPr/>
-        <p:txBody>
-          <a:bodyPr/>
-          <a:lstStyle/>
-          <a:p>
-            <a:endParaRPr lang="en-US" dirty="0"/>
-          </a:p>
-        </p:txBody>
-      </p:sp>
-      <p:sp>
-        <p:nvSpPr>
-          <p:cNvPr id="28" name="Text Placeholder 27">
-            <a:extLst>
-              <a:ext uri="{FF2B5EF4-FFF2-40B4-BE49-F238E27FC236}">
-                <a16:creationId xmlns:a16="http://schemas.microsoft.com/office/drawing/2014/main" id="{AD120F7B-96C1-4055-A6C8-43B77ABE7796}"/>
-              </a:ext>
-            </a:extLst>
-          </p:cNvPr>
-          <p:cNvSpPr>
-            <a:spLocks noGrp="1"/>
-          </p:cNvSpPr>
-          <p:nvPr>
-            <p:ph type="body" sz="quarter" idx="33"/>
-          </p:nvPr>
-        </p:nvSpPr>
-        <p:spPr/>
-        <p:txBody>
-          <a:bodyPr/>
-          <a:lstStyle/>
-          <a:p>
-            <a:endParaRPr lang="en-US" dirty="0"/>
-          </a:p>
-        </p:txBody>
-      </p:sp>
-      <p:sp>
-        <p:nvSpPr>
-          <p:cNvPr id="30" name="Text Placeholder 29">
-            <a:extLst>
-              <a:ext uri="{FF2B5EF4-FFF2-40B4-BE49-F238E27FC236}">
-                <a16:creationId xmlns:a16="http://schemas.microsoft.com/office/drawing/2014/main" id="{63CE7442-1E38-4308-977B-D13F1482BD8D}"/>
-              </a:ext>
-            </a:extLst>
-          </p:cNvPr>
-          <p:cNvSpPr>
-            <a:spLocks noGrp="1"/>
-          </p:cNvSpPr>
-          <p:nvPr>
-            <p:ph type="body" idx="34"/>
-          </p:nvPr>
-        </p:nvSpPr>
-        <p:spPr/>
-        <p:txBody>
-          <a:bodyPr/>
-          <a:lstStyle/>
-          <a:p>
-            <a:endParaRPr lang="en-US" dirty="0"/>
-          </a:p>
-        </p:txBody>
-      </p:sp>
-      <p:sp>
-        <p:nvSpPr>
-          <p:cNvPr id="32" name="Text Placeholder 31">
-            <a:extLst>
-              <a:ext uri="{FF2B5EF4-FFF2-40B4-BE49-F238E27FC236}">
-                <a16:creationId xmlns:a16="http://schemas.microsoft.com/office/drawing/2014/main" id="{0FABA840-15F7-4C03-B906-8C1F6E618434}"/>
-              </a:ext>
-            </a:extLst>
-          </p:cNvPr>
-          <p:cNvSpPr>
-            <a:spLocks noGrp="1"/>
-          </p:cNvSpPr>
-          <p:nvPr>
-            <p:ph type="body" sz="quarter" idx="35"/>
-          </p:nvPr>
-        </p:nvSpPr>
-        <p:spPr/>
-        <p:txBody>
-          <a:bodyPr/>
-          <a:lstStyle/>
-          <a:p>
-            <a:endParaRPr lang="en-US" dirty="0"/>
-          </a:p>
-        </p:txBody>
-      </p:sp>
-      <p:sp>
-        <p:nvSpPr>
-          <p:cNvPr id="34" name="Text Placeholder 33">
-            <a:extLst>
-              <a:ext uri="{FF2B5EF4-FFF2-40B4-BE49-F238E27FC236}">
-                <a16:creationId xmlns:a16="http://schemas.microsoft.com/office/drawing/2014/main" id="{8EB4679E-4B8E-47DA-ACF3-D96AAEB0303D}"/>
-              </a:ext>
-            </a:extLst>
-          </p:cNvPr>
-          <p:cNvSpPr>
-            <a:spLocks noGrp="1"/>
-          </p:cNvSpPr>
-          <p:nvPr>
-            <p:ph type="body" idx="36"/>
-          </p:nvPr>
-        </p:nvSpPr>
-        <p:spPr/>
-        <p:txBody>
-          <a:bodyPr/>
-          <a:lstStyle/>
-          <a:p>
-            <a:endParaRPr lang="en-US" dirty="0"/>
-          </a:p>
-        </p:txBody>
-      </p:sp>
-      <p:sp>
-        <p:nvSpPr>
-          <p:cNvPr id="36" name="Text Placeholder 35">
-            <a:extLst>
-              <a:ext uri="{FF2B5EF4-FFF2-40B4-BE49-F238E27FC236}">
-                <a16:creationId xmlns:a16="http://schemas.microsoft.com/office/drawing/2014/main" id="{1A1C4866-1D61-47C6-81EE-0BC6541588A1}"/>
-              </a:ext>
-            </a:extLst>
-          </p:cNvPr>
-          <p:cNvSpPr>
-            <a:spLocks noGrp="1"/>
-          </p:cNvSpPr>
-          <p:nvPr>
-            <p:ph type="body" sz="quarter" idx="37"/>
-          </p:nvPr>
-        </p:nvSpPr>
-        <p:spPr/>
-        <p:txBody>
-          <a:bodyPr/>
-          <a:lstStyle/>
-          <a:p>
-            <a:endParaRPr lang="en-US" dirty="0"/>
-          </a:p>
-        </p:txBody>
-      </p:sp>
-      <p:sp>
-        <p:nvSpPr>
-          <p:cNvPr id="38" name="Text Placeholder 37">
-            <a:extLst>
-              <a:ext uri="{FF2B5EF4-FFF2-40B4-BE49-F238E27FC236}">
-                <a16:creationId xmlns:a16="http://schemas.microsoft.com/office/drawing/2014/main" id="{66BEEB3F-6529-4F71-841C-029B3106FBC0}"/>
-              </a:ext>
-            </a:extLst>
-          </p:cNvPr>
-          <p:cNvSpPr>
-            <a:spLocks noGrp="1"/>
-          </p:cNvSpPr>
-          <p:nvPr>
-            <p:ph type="body" idx="38"/>
-          </p:nvPr>
-        </p:nvSpPr>
-        <p:spPr/>
-        <p:txBody>
-          <a:bodyPr/>
-          <a:lstStyle/>
-          <a:p>
-            <a:endParaRPr lang="en-US" dirty="0"/>
-          </a:p>
-        </p:txBody>
-      </p:sp>
-    </p:spTree>
-    <p:extLst>
-      <p:ext uri="{BB962C8B-B14F-4D97-AF65-F5344CB8AC3E}">
-        <p14:creationId xmlns:p14="http://schemas.microsoft.com/office/powerpoint/2010/main" val="1098878064"/>
-      </p:ext>
-    </p:extLst>
-  </p:cSld>
-  <p:clrMapOvr>
-    <a:masterClrMapping/>
-  </p:clrMapOvr>
-</p:sld>
-</file>
-
 <file path=ppt/slides/slide2.xml><?xml version="1.0" encoding="utf-8"?>
 <p:sld xmlns:a="http://schemas.openxmlformats.org/drawingml/2006/main" xmlns:r="http://schemas.openxmlformats.org/officeDocument/2006/relationships" xmlns:p="http://schemas.openxmlformats.org/presentationml/2006/main">
   <p:cSld>
@@ -25893,7 +24203,17 @@
             </a:pPr>
             <a:r>
               <a:rPr lang="en-US" sz="2800" dirty="0"/>
-              <a:t>Power of Habit</a:t>
+              <a:t>Power of Habit - by Charles Duhigg, Mike Chamberlain</a:t>
+            </a:r>
+          </a:p>
+          <a:p>
+            <a:pPr marL="285750" indent="-285750">
+              <a:buFont typeface="Arial" panose="020B0604020202020204" pitchFamily="34" charset="0"/>
+              <a:buChar char="•"/>
+            </a:pPr>
+            <a:r>
+              <a:rPr lang="en-US" sz="2800" dirty="0"/>
+              <a:t>Atomic Habits – James Clear</a:t>
             </a:r>
           </a:p>
           <a:p>

</xml_diff>